<commit_message>
*** empty log message ***
</commit_message>
<xml_diff>
--- a/pacman/doc/PacMan.pptx
+++ b/pacman/doc/PacMan.pptx
@@ -4873,17 +4873,8 @@
             </a:r>
             <a:r>
               <a:rPr lang="de-CH" sz="2400" dirty="0" smtClean="0"/>
-              <a:t> </a:t>
-            </a:r>
-            <a:r>
-              <a:rPr lang="de-CH" sz="2400" dirty="0" smtClean="0"/>
-              <a:t>(</a:t>
-            </a:r>
-            <a:r>
-              <a:rPr lang="de-CH" sz="2400" dirty="0" smtClean="0"/>
-              <a:t>1vs1)</a:t>
-            </a:r>
-            <a:endParaRPr lang="de-CH" sz="2400" dirty="0" smtClean="0"/>
+              <a:t> (1vs1)</a:t>
+            </a:r>
           </a:p>
           <a:p>
             <a:pPr lvl="1"/>
@@ -4893,15 +4884,49 @@
             </a:r>
           </a:p>
           <a:p>
+            <a:endParaRPr lang="de-CH" sz="2400" dirty="0" smtClean="0"/>
+          </a:p>
+          <a:p>
             <a:r>
               <a:rPr lang="de-CH" sz="2400" dirty="0" smtClean="0"/>
-              <a:t>Beides sind </a:t>
-            </a:r>
-            <a:r>
-              <a:rPr lang="de-CH" sz="2400" dirty="0" err="1" smtClean="0"/>
-              <a:t>Computergegener</a:t>
+              <a:t>Beides sind computergesteuerte Spieler</a:t>
             </a:r>
             <a:endParaRPr lang="de-CH" sz="2400" dirty="0" smtClean="0"/>
+          </a:p>
+          <a:p>
+            <a:pPr>
+              <a:buNone/>
+            </a:pPr>
+            <a:endParaRPr lang="de-CH" sz="2400" dirty="0" smtClean="0"/>
+          </a:p>
+          <a:p>
+            <a:r>
+              <a:rPr lang="de-CH" sz="2400" dirty="0" smtClean="0"/>
+              <a:t>Realisierung</a:t>
+            </a:r>
+          </a:p>
+          <a:p>
+            <a:pPr lvl="1"/>
+            <a:r>
+              <a:rPr lang="de-CH" sz="2000" dirty="0" smtClean="0"/>
+              <a:t>Feld </a:t>
+            </a:r>
+            <a:r>
+              <a:rPr lang="de-CH" sz="2000" dirty="0" smtClean="0">
+                <a:sym typeface="Wingdings" pitchFamily="2" charset="2"/>
+              </a:rPr>
+              <a:t> Array</a:t>
+            </a:r>
+          </a:p>
+          <a:p>
+            <a:pPr lvl="1"/>
+            <a:r>
+              <a:rPr lang="de-CH" sz="2000" dirty="0" smtClean="0">
+                <a:sym typeface="Wingdings" pitchFamily="2" charset="2"/>
+              </a:rPr>
+              <a:t>Wege  Graph</a:t>
+            </a:r>
+            <a:endParaRPr lang="de-CH" sz="2000" dirty="0" smtClean="0"/>
           </a:p>
         </p:txBody>
       </p:sp>
@@ -5106,7 +5131,7 @@
                                         <p:tgtEl>
                                           <p:spTgt spid="2">
                                             <p:txEl>
-                                              <p:pRg st="2" end="2"/>
+                                              <p:pRg st="3" end="3"/>
                                             </p:txEl>
                                           </p:spTgt>
                                         </p:tgtEl>
@@ -5124,7 +5149,466 @@
                                         <p:tgtEl>
                                           <p:spTgt spid="2">
                                             <p:txEl>
-                                              <p:pRg st="2" end="2"/>
+                                              <p:pRg st="3" end="3"/>
+                                            </p:txEl>
+                                          </p:spTgt>
+                                        </p:tgtEl>
+                                      </p:cBhvr>
+                                    </p:animEffect>
+                                  </p:childTnLst>
+                                </p:cTn>
+                              </p:par>
+                            </p:childTnLst>
+                          </p:cTn>
+                        </p:par>
+                      </p:childTnLst>
+                    </p:cTn>
+                  </p:par>
+                  <p:par>
+                    <p:cTn id="16" fill="hold">
+                      <p:stCondLst>
+                        <p:cond delay="indefinite"/>
+                      </p:stCondLst>
+                      <p:childTnLst>
+                        <p:par>
+                          <p:cTn id="17" fill="hold">
+                            <p:stCondLst>
+                              <p:cond delay="0"/>
+                            </p:stCondLst>
+                            <p:childTnLst>
+                              <p:par>
+                                <p:cTn id="18" presetID="3" presetClass="entr" presetSubtype="10" fill="hold" grpId="0" nodeType="clickEffect">
+                                  <p:stCondLst>
+                                    <p:cond delay="0"/>
+                                  </p:stCondLst>
+                                  <p:childTnLst>
+                                    <p:set>
+                                      <p:cBhvr>
+                                        <p:cTn id="19" dur="1" fill="hold">
+                                          <p:stCondLst>
+                                            <p:cond delay="0"/>
+                                          </p:stCondLst>
+                                        </p:cTn>
+                                        <p:tgtEl>
+                                          <p:spTgt spid="2">
+                                            <p:txEl>
+                                              <p:pRg st="5" end="5"/>
+                                            </p:txEl>
+                                          </p:spTgt>
+                                        </p:tgtEl>
+                                        <p:attrNameLst>
+                                          <p:attrName>style.visibility</p:attrName>
+                                        </p:attrNameLst>
+                                      </p:cBhvr>
+                                      <p:to>
+                                        <p:strVal val="visible"/>
+                                      </p:to>
+                                    </p:set>
+                                    <p:animEffect transition="in" filter="blinds(horizontal)">
+                                      <p:cBhvr>
+                                        <p:cTn id="20" dur="500"/>
+                                        <p:tgtEl>
+                                          <p:spTgt spid="2">
+                                            <p:txEl>
+                                              <p:pRg st="5" end="5"/>
+                                            </p:txEl>
+                                          </p:spTgt>
+                                        </p:tgtEl>
+                                      </p:cBhvr>
+                                    </p:animEffect>
+                                  </p:childTnLst>
+                                </p:cTn>
+                              </p:par>
+                              <p:par>
+                                <p:cTn id="21" presetID="3" presetClass="entr" presetSubtype="10" fill="hold" grpId="0" nodeType="withEffect">
+                                  <p:stCondLst>
+                                    <p:cond delay="0"/>
+                                  </p:stCondLst>
+                                  <p:childTnLst>
+                                    <p:set>
+                                      <p:cBhvr>
+                                        <p:cTn id="22" dur="1" fill="hold">
+                                          <p:stCondLst>
+                                            <p:cond delay="0"/>
+                                          </p:stCondLst>
+                                        </p:cTn>
+                                        <p:tgtEl>
+                                          <p:spTgt spid="2">
+                                            <p:txEl>
+                                              <p:pRg st="6" end="6"/>
+                                            </p:txEl>
+                                          </p:spTgt>
+                                        </p:tgtEl>
+                                        <p:attrNameLst>
+                                          <p:attrName>style.visibility</p:attrName>
+                                        </p:attrNameLst>
+                                      </p:cBhvr>
+                                      <p:to>
+                                        <p:strVal val="visible"/>
+                                      </p:to>
+                                    </p:set>
+                                    <p:animEffect transition="in" filter="blinds(horizontal)">
+                                      <p:cBhvr>
+                                        <p:cTn id="23" dur="500"/>
+                                        <p:tgtEl>
+                                          <p:spTgt spid="2">
+                                            <p:txEl>
+                                              <p:pRg st="6" end="6"/>
+                                            </p:txEl>
+                                          </p:spTgt>
+                                        </p:tgtEl>
+                                      </p:cBhvr>
+                                    </p:animEffect>
+                                  </p:childTnLst>
+                                </p:cTn>
+                              </p:par>
+                              <p:par>
+                                <p:cTn id="24" presetID="3" presetClass="entr" presetSubtype="10" fill="hold" grpId="0" nodeType="withEffect">
+                                  <p:stCondLst>
+                                    <p:cond delay="0"/>
+                                  </p:stCondLst>
+                                  <p:childTnLst>
+                                    <p:set>
+                                      <p:cBhvr>
+                                        <p:cTn id="25" dur="1" fill="hold">
+                                          <p:stCondLst>
+                                            <p:cond delay="0"/>
+                                          </p:stCondLst>
+                                        </p:cTn>
+                                        <p:tgtEl>
+                                          <p:spTgt spid="2">
+                                            <p:txEl>
+                                              <p:pRg st="7" end="7"/>
+                                            </p:txEl>
+                                          </p:spTgt>
+                                        </p:tgtEl>
+                                        <p:attrNameLst>
+                                          <p:attrName>style.visibility</p:attrName>
+                                        </p:attrNameLst>
+                                      </p:cBhvr>
+                                      <p:to>
+                                        <p:strVal val="visible"/>
+                                      </p:to>
+                                    </p:set>
+                                    <p:animEffect transition="in" filter="blinds(horizontal)">
+                                      <p:cBhvr>
+                                        <p:cTn id="26" dur="500"/>
+                                        <p:tgtEl>
+                                          <p:spTgt spid="2">
+                                            <p:txEl>
+                                              <p:pRg st="7" end="7"/>
+                                            </p:txEl>
+                                          </p:spTgt>
+                                        </p:tgtEl>
+                                      </p:cBhvr>
+                                    </p:animEffect>
+                                  </p:childTnLst>
+                                </p:cTn>
+                              </p:par>
+                            </p:childTnLst>
+                          </p:cTn>
+                        </p:par>
+                      </p:childTnLst>
+                    </p:cTn>
+                  </p:par>
+                  <p:par>
+                    <p:cTn id="27" fill="hold">
+                      <p:stCondLst>
+                        <p:cond delay="indefinite"/>
+                      </p:stCondLst>
+                      <p:childTnLst>
+                        <p:par>
+                          <p:cTn id="28" fill="hold">
+                            <p:stCondLst>
+                              <p:cond delay="0"/>
+                            </p:stCondLst>
+                            <p:childTnLst>
+                              <p:par>
+                                <p:cTn id="29" presetID="3" presetClass="entr" presetSubtype="10" fill="hold" grpId="1" nodeType="clickEffect">
+                                  <p:stCondLst>
+                                    <p:cond delay="0"/>
+                                  </p:stCondLst>
+                                  <p:childTnLst>
+                                    <p:set>
+                                      <p:cBhvr>
+                                        <p:cTn id="30" dur="1" fill="hold">
+                                          <p:stCondLst>
+                                            <p:cond delay="0"/>
+                                          </p:stCondLst>
+                                        </p:cTn>
+                                        <p:tgtEl>
+                                          <p:spTgt spid="2">
+                                            <p:txEl>
+                                              <p:pRg st="0" end="0"/>
+                                            </p:txEl>
+                                          </p:spTgt>
+                                        </p:tgtEl>
+                                        <p:attrNameLst>
+                                          <p:attrName>style.visibility</p:attrName>
+                                        </p:attrNameLst>
+                                      </p:cBhvr>
+                                      <p:to>
+                                        <p:strVal val="visible"/>
+                                      </p:to>
+                                    </p:set>
+                                    <p:animEffect transition="in" filter="blinds(horizontal)">
+                                      <p:cBhvr>
+                                        <p:cTn id="31" dur="500"/>
+                                        <p:tgtEl>
+                                          <p:spTgt spid="2">
+                                            <p:txEl>
+                                              <p:pRg st="0" end="0"/>
+                                            </p:txEl>
+                                          </p:spTgt>
+                                        </p:tgtEl>
+                                      </p:cBhvr>
+                                    </p:animEffect>
+                                  </p:childTnLst>
+                                </p:cTn>
+                              </p:par>
+                              <p:par>
+                                <p:cTn id="32" presetID="3" presetClass="entr" presetSubtype="10" fill="hold" grpId="1" nodeType="withEffect">
+                                  <p:stCondLst>
+                                    <p:cond delay="0"/>
+                                  </p:stCondLst>
+                                  <p:childTnLst>
+                                    <p:set>
+                                      <p:cBhvr>
+                                        <p:cTn id="33" dur="1" fill="hold">
+                                          <p:stCondLst>
+                                            <p:cond delay="0"/>
+                                          </p:stCondLst>
+                                        </p:cTn>
+                                        <p:tgtEl>
+                                          <p:spTgt spid="2">
+                                            <p:txEl>
+                                              <p:pRg st="1" end="1"/>
+                                            </p:txEl>
+                                          </p:spTgt>
+                                        </p:tgtEl>
+                                        <p:attrNameLst>
+                                          <p:attrName>style.visibility</p:attrName>
+                                        </p:attrNameLst>
+                                      </p:cBhvr>
+                                      <p:to>
+                                        <p:strVal val="visible"/>
+                                      </p:to>
+                                    </p:set>
+                                    <p:animEffect transition="in" filter="blinds(horizontal)">
+                                      <p:cBhvr>
+                                        <p:cTn id="34" dur="500"/>
+                                        <p:tgtEl>
+                                          <p:spTgt spid="2">
+                                            <p:txEl>
+                                              <p:pRg st="1" end="1"/>
+                                            </p:txEl>
+                                          </p:spTgt>
+                                        </p:tgtEl>
+                                      </p:cBhvr>
+                                    </p:animEffect>
+                                  </p:childTnLst>
+                                </p:cTn>
+                              </p:par>
+                            </p:childTnLst>
+                          </p:cTn>
+                        </p:par>
+                      </p:childTnLst>
+                    </p:cTn>
+                  </p:par>
+                  <p:par>
+                    <p:cTn id="35" fill="hold">
+                      <p:stCondLst>
+                        <p:cond delay="indefinite"/>
+                      </p:stCondLst>
+                      <p:childTnLst>
+                        <p:par>
+                          <p:cTn id="36" fill="hold">
+                            <p:stCondLst>
+                              <p:cond delay="0"/>
+                            </p:stCondLst>
+                            <p:childTnLst>
+                              <p:par>
+                                <p:cTn id="37" presetID="3" presetClass="entr" presetSubtype="10" fill="hold" grpId="1" nodeType="clickEffect">
+                                  <p:stCondLst>
+                                    <p:cond delay="0"/>
+                                  </p:stCondLst>
+                                  <p:childTnLst>
+                                    <p:set>
+                                      <p:cBhvr>
+                                        <p:cTn id="38" dur="1" fill="hold">
+                                          <p:stCondLst>
+                                            <p:cond delay="0"/>
+                                          </p:stCondLst>
+                                        </p:cTn>
+                                        <p:tgtEl>
+                                          <p:spTgt spid="2">
+                                            <p:txEl>
+                                              <p:pRg st="3" end="3"/>
+                                            </p:txEl>
+                                          </p:spTgt>
+                                        </p:tgtEl>
+                                        <p:attrNameLst>
+                                          <p:attrName>style.visibility</p:attrName>
+                                        </p:attrNameLst>
+                                      </p:cBhvr>
+                                      <p:to>
+                                        <p:strVal val="visible"/>
+                                      </p:to>
+                                    </p:set>
+                                    <p:animEffect transition="in" filter="blinds(horizontal)">
+                                      <p:cBhvr>
+                                        <p:cTn id="39" dur="500"/>
+                                        <p:tgtEl>
+                                          <p:spTgt spid="2">
+                                            <p:txEl>
+                                              <p:pRg st="3" end="3"/>
+                                            </p:txEl>
+                                          </p:spTgt>
+                                        </p:tgtEl>
+                                      </p:cBhvr>
+                                    </p:animEffect>
+                                  </p:childTnLst>
+                                </p:cTn>
+                              </p:par>
+                            </p:childTnLst>
+                          </p:cTn>
+                        </p:par>
+                      </p:childTnLst>
+                    </p:cTn>
+                  </p:par>
+                  <p:par>
+                    <p:cTn id="40" fill="hold">
+                      <p:stCondLst>
+                        <p:cond delay="indefinite"/>
+                      </p:stCondLst>
+                      <p:childTnLst>
+                        <p:par>
+                          <p:cTn id="41" fill="hold">
+                            <p:stCondLst>
+                              <p:cond delay="0"/>
+                            </p:stCondLst>
+                            <p:childTnLst>
+                              <p:par>
+                                <p:cTn id="42" presetID="3" presetClass="entr" presetSubtype="10" fill="hold" grpId="1" nodeType="clickEffect">
+                                  <p:stCondLst>
+                                    <p:cond delay="0"/>
+                                  </p:stCondLst>
+                                  <p:childTnLst>
+                                    <p:set>
+                                      <p:cBhvr>
+                                        <p:cTn id="43" dur="1" fill="hold">
+                                          <p:stCondLst>
+                                            <p:cond delay="0"/>
+                                          </p:stCondLst>
+                                        </p:cTn>
+                                        <p:tgtEl>
+                                          <p:spTgt spid="2">
+                                            <p:txEl>
+                                              <p:pRg st="5" end="5"/>
+                                            </p:txEl>
+                                          </p:spTgt>
+                                        </p:tgtEl>
+                                        <p:attrNameLst>
+                                          <p:attrName>style.visibility</p:attrName>
+                                        </p:attrNameLst>
+                                      </p:cBhvr>
+                                      <p:to>
+                                        <p:strVal val="visible"/>
+                                      </p:to>
+                                    </p:set>
+                                    <p:animEffect transition="in" filter="blinds(horizontal)">
+                                      <p:cBhvr>
+                                        <p:cTn id="44" dur="500"/>
+                                        <p:tgtEl>
+                                          <p:spTgt spid="2">
+                                            <p:txEl>
+                                              <p:pRg st="5" end="5"/>
+                                            </p:txEl>
+                                          </p:spTgt>
+                                        </p:tgtEl>
+                                      </p:cBhvr>
+                                    </p:animEffect>
+                                  </p:childTnLst>
+                                </p:cTn>
+                              </p:par>
+                              <p:par>
+                                <p:cTn id="45" presetID="3" presetClass="entr" presetSubtype="10" fill="hold" grpId="1" nodeType="withEffect">
+                                  <p:stCondLst>
+                                    <p:cond delay="0"/>
+                                  </p:stCondLst>
+                                  <p:childTnLst>
+                                    <p:set>
+                                      <p:cBhvr>
+                                        <p:cTn id="46" dur="1" fill="hold">
+                                          <p:stCondLst>
+                                            <p:cond delay="0"/>
+                                          </p:stCondLst>
+                                        </p:cTn>
+                                        <p:tgtEl>
+                                          <p:spTgt spid="2">
+                                            <p:txEl>
+                                              <p:pRg st="6" end="6"/>
+                                            </p:txEl>
+                                          </p:spTgt>
+                                        </p:tgtEl>
+                                        <p:attrNameLst>
+                                          <p:attrName>style.visibility</p:attrName>
+                                        </p:attrNameLst>
+                                      </p:cBhvr>
+                                      <p:to>
+                                        <p:strVal val="visible"/>
+                                      </p:to>
+                                    </p:set>
+                                    <p:animEffect transition="in" filter="blinds(horizontal)">
+                                      <p:cBhvr>
+                                        <p:cTn id="47" dur="500"/>
+                                        <p:tgtEl>
+                                          <p:spTgt spid="2">
+                                            <p:txEl>
+                                              <p:pRg st="6" end="6"/>
+                                            </p:txEl>
+                                          </p:spTgt>
+                                        </p:tgtEl>
+                                      </p:cBhvr>
+                                    </p:animEffect>
+                                  </p:childTnLst>
+                                </p:cTn>
+                              </p:par>
+                              <p:par>
+                                <p:cTn id="48" presetID="3" presetClass="entr" presetSubtype="10" fill="hold" grpId="1" nodeType="withEffect">
+                                  <p:stCondLst>
+                                    <p:cond delay="0"/>
+                                  </p:stCondLst>
+                                  <p:childTnLst>
+                                    <p:set>
+                                      <p:cBhvr>
+                                        <p:cTn id="49" dur="1" fill="hold">
+                                          <p:stCondLst>
+                                            <p:cond delay="0"/>
+                                          </p:stCondLst>
+                                        </p:cTn>
+                                        <p:tgtEl>
+                                          <p:spTgt spid="2">
+                                            <p:txEl>
+                                              <p:pRg st="7" end="7"/>
+                                            </p:txEl>
+                                          </p:spTgt>
+                                        </p:tgtEl>
+                                        <p:attrNameLst>
+                                          <p:attrName>style.visibility</p:attrName>
+                                        </p:attrNameLst>
+                                      </p:cBhvr>
+                                      <p:to>
+                                        <p:strVal val="visible"/>
+                                      </p:to>
+                                    </p:set>
+                                    <p:animEffect transition="in" filter="blinds(horizontal)">
+                                      <p:cBhvr>
+                                        <p:cTn id="50" dur="500"/>
+                                        <p:tgtEl>
+                                          <p:spTgt spid="2">
+                                            <p:txEl>
+                                              <p:pRg st="7" end="7"/>
                                             </p:txEl>
                                           </p:spTgt>
                                         </p:tgtEl>
@@ -5162,6 +5646,7 @@
     </p:tnLst>
     <p:bldLst>
       <p:bldP spid="2" grpId="0" uiExpand="1" build="p"/>
+      <p:bldP spid="2" grpId="1" build="p"/>
     </p:bldLst>
   </p:timing>
 </p:sld>
@@ -5303,7 +5788,6 @@
               <a:rPr lang="de-CH" sz="2000" dirty="0" smtClean="0"/>
               <a:t>Quadrate der Abstände möglichst max. oder min.</a:t>
             </a:r>
-            <a:endParaRPr lang="de-CH" sz="2000" dirty="0" smtClean="0"/>
           </a:p>
         </p:txBody>
       </p:sp>
@@ -6944,11 +7428,7 @@
                                           </p:stCondLst>
                                         </p:cTn>
                                         <p:tgtEl>
-                                          <p:spTgt spid="2">
-                                            <p:txEl>
-                                              <p:pRg st="6" end="6"/>
-                                            </p:txEl>
-                                          </p:spTgt>
+                                          <p:spTgt spid="4"/>
                                         </p:tgtEl>
                                         <p:attrNameLst>
                                           <p:attrName>style.visibility</p:attrName>
@@ -6962,140 +7442,7 @@
                                       <p:cBhvr>
                                         <p:cTn id="23" dur="500"/>
                                         <p:tgtEl>
-                                          <p:spTgt spid="2">
-                                            <p:txEl>
-                                              <p:pRg st="6" end="6"/>
-                                            </p:txEl>
-                                          </p:spTgt>
-                                        </p:tgtEl>
-                                      </p:cBhvr>
-                                    </p:animEffect>
-                                  </p:childTnLst>
-                                </p:cTn>
-                              </p:par>
-                              <p:par>
-                                <p:cTn id="24" presetID="3" presetClass="entr" presetSubtype="10" fill="hold" grpId="0" nodeType="withEffect">
-                                  <p:stCondLst>
-                                    <p:cond delay="0"/>
-                                  </p:stCondLst>
-                                  <p:childTnLst>
-                                    <p:set>
-                                      <p:cBhvr>
-                                        <p:cTn id="25" dur="1" fill="hold">
-                                          <p:stCondLst>
-                                            <p:cond delay="0"/>
-                                          </p:stCondLst>
-                                        </p:cTn>
-                                        <p:tgtEl>
-                                          <p:spTgt spid="2">
-                                            <p:txEl>
-                                              <p:pRg st="7" end="7"/>
-                                            </p:txEl>
-                                          </p:spTgt>
-                                        </p:tgtEl>
-                                        <p:attrNameLst>
-                                          <p:attrName>style.visibility</p:attrName>
-                                        </p:attrNameLst>
-                                      </p:cBhvr>
-                                      <p:to>
-                                        <p:strVal val="visible"/>
-                                      </p:to>
-                                    </p:set>
-                                    <p:animEffect transition="in" filter="blinds(horizontal)">
-                                      <p:cBhvr>
-                                        <p:cTn id="26" dur="500"/>
-                                        <p:tgtEl>
-                                          <p:spTgt spid="2">
-                                            <p:txEl>
-                                              <p:pRg st="7" end="7"/>
-                                            </p:txEl>
-                                          </p:spTgt>
-                                        </p:tgtEl>
-                                      </p:cBhvr>
-                                    </p:animEffect>
-                                  </p:childTnLst>
-                                </p:cTn>
-                              </p:par>
-                              <p:par>
-                                <p:cTn id="27" presetID="3" presetClass="entr" presetSubtype="10" fill="hold" grpId="0" nodeType="withEffect">
-                                  <p:stCondLst>
-                                    <p:cond delay="0"/>
-                                  </p:stCondLst>
-                                  <p:childTnLst>
-                                    <p:set>
-                                      <p:cBhvr>
-                                        <p:cTn id="28" dur="1" fill="hold">
-                                          <p:stCondLst>
-                                            <p:cond delay="0"/>
-                                          </p:stCondLst>
-                                        </p:cTn>
-                                        <p:tgtEl>
-                                          <p:spTgt spid="2">
-                                            <p:txEl>
-                                              <p:pRg st="8" end="8"/>
-                                            </p:txEl>
-                                          </p:spTgt>
-                                        </p:tgtEl>
-                                        <p:attrNameLst>
-                                          <p:attrName>style.visibility</p:attrName>
-                                        </p:attrNameLst>
-                                      </p:cBhvr>
-                                      <p:to>
-                                        <p:strVal val="visible"/>
-                                      </p:to>
-                                    </p:set>
-                                    <p:animEffect transition="in" filter="blinds(horizontal)">
-                                      <p:cBhvr>
-                                        <p:cTn id="29" dur="500"/>
-                                        <p:tgtEl>
-                                          <p:spTgt spid="2">
-                                            <p:txEl>
-                                              <p:pRg st="8" end="8"/>
-                                            </p:txEl>
-                                          </p:spTgt>
-                                        </p:tgtEl>
-                                      </p:cBhvr>
-                                    </p:animEffect>
-                                  </p:childTnLst>
-                                </p:cTn>
-                              </p:par>
-                              <p:par>
-                                <p:cTn id="30" presetID="3" presetClass="entr" presetSubtype="10" fill="hold" grpId="0" nodeType="withEffect">
-                                  <p:stCondLst>
-                                    <p:cond delay="0"/>
-                                  </p:stCondLst>
-                                  <p:childTnLst>
-                                    <p:set>
-                                      <p:cBhvr>
-                                        <p:cTn id="31" dur="1" fill="hold">
-                                          <p:stCondLst>
-                                            <p:cond delay="0"/>
-                                          </p:stCondLst>
-                                        </p:cTn>
-                                        <p:tgtEl>
-                                          <p:spTgt spid="2">
-                                            <p:txEl>
-                                              <p:pRg st="9" end="9"/>
-                                            </p:txEl>
-                                          </p:spTgt>
-                                        </p:tgtEl>
-                                        <p:attrNameLst>
-                                          <p:attrName>style.visibility</p:attrName>
-                                        </p:attrNameLst>
-                                      </p:cBhvr>
-                                      <p:to>
-                                        <p:strVal val="visible"/>
-                                      </p:to>
-                                    </p:set>
-                                    <p:animEffect transition="in" filter="blinds(horizontal)">
-                                      <p:cBhvr>
-                                        <p:cTn id="32" dur="500"/>
-                                        <p:tgtEl>
-                                          <p:spTgt spid="2">
-                                            <p:txEl>
-                                              <p:pRg st="9" end="9"/>
-                                            </p:txEl>
-                                          </p:spTgt>
+                                          <p:spTgt spid="4"/>
                                         </p:tgtEl>
                                       </p:cBhvr>
                                     </p:animEffect>
@@ -7109,32 +7456,137 @@
                     </p:cTn>
                   </p:par>
                   <p:par>
-                    <p:cTn id="33" fill="hold">
+                    <p:cTn id="24" fill="hold">
                       <p:stCondLst>
                         <p:cond delay="indefinite"/>
                       </p:stCondLst>
                       <p:childTnLst>
                         <p:par>
-                          <p:cTn id="34" fill="hold">
+                          <p:cTn id="25" fill="hold">
                             <p:stCondLst>
                               <p:cond delay="0"/>
                             </p:stCondLst>
                             <p:childTnLst>
                               <p:par>
-                                <p:cTn id="35" presetID="3" presetClass="entr" presetSubtype="10" fill="hold" grpId="0" nodeType="clickEffect">
+                                <p:cTn id="26" presetID="3" presetClass="entr" presetSubtype="10" fill="hold" grpId="0" nodeType="clickEffect">
                                   <p:stCondLst>
                                     <p:cond delay="0"/>
                                   </p:stCondLst>
                                   <p:childTnLst>
                                     <p:set>
                                       <p:cBhvr>
+                                        <p:cTn id="27" dur="1" fill="hold">
+                                          <p:stCondLst>
+                                            <p:cond delay="0"/>
+                                          </p:stCondLst>
+                                        </p:cTn>
+                                        <p:tgtEl>
+                                          <p:spTgt spid="5"/>
+                                        </p:tgtEl>
+                                        <p:attrNameLst>
+                                          <p:attrName>style.visibility</p:attrName>
+                                        </p:attrNameLst>
+                                      </p:cBhvr>
+                                      <p:to>
+                                        <p:strVal val="visible"/>
+                                      </p:to>
+                                    </p:set>
+                                    <p:animEffect transition="in" filter="blinds(horizontal)">
+                                      <p:cBhvr>
+                                        <p:cTn id="28" dur="500"/>
+                                        <p:tgtEl>
+                                          <p:spTgt spid="5"/>
+                                        </p:tgtEl>
+                                      </p:cBhvr>
+                                    </p:animEffect>
+                                  </p:childTnLst>
+                                </p:cTn>
+                              </p:par>
+                              <p:par>
+                                <p:cTn id="29" presetID="3" presetClass="entr" presetSubtype="10" fill="hold" grpId="0" nodeType="withEffect">
+                                  <p:stCondLst>
+                                    <p:cond delay="0"/>
+                                  </p:stCondLst>
+                                  <p:childTnLst>
+                                    <p:set>
+                                      <p:cBhvr>
+                                        <p:cTn id="30" dur="1" fill="hold">
+                                          <p:stCondLst>
+                                            <p:cond delay="0"/>
+                                          </p:stCondLst>
+                                        </p:cTn>
+                                        <p:tgtEl>
+                                          <p:spTgt spid="6"/>
+                                        </p:tgtEl>
+                                        <p:attrNameLst>
+                                          <p:attrName>style.visibility</p:attrName>
+                                        </p:attrNameLst>
+                                      </p:cBhvr>
+                                      <p:to>
+                                        <p:strVal val="visible"/>
+                                      </p:to>
+                                    </p:set>
+                                    <p:animEffect transition="in" filter="blinds(horizontal)">
+                                      <p:cBhvr>
+                                        <p:cTn id="31" dur="500"/>
+                                        <p:tgtEl>
+                                          <p:spTgt spid="6"/>
+                                        </p:tgtEl>
+                                      </p:cBhvr>
+                                    </p:animEffect>
+                                  </p:childTnLst>
+                                </p:cTn>
+                              </p:par>
+                              <p:par>
+                                <p:cTn id="32" presetID="3" presetClass="entr" presetSubtype="10" fill="hold" grpId="0" nodeType="withEffect">
+                                  <p:stCondLst>
+                                    <p:cond delay="0"/>
+                                  </p:stCondLst>
+                                  <p:childTnLst>
+                                    <p:set>
+                                      <p:cBhvr>
+                                        <p:cTn id="33" dur="1" fill="hold">
+                                          <p:stCondLst>
+                                            <p:cond delay="0"/>
+                                          </p:stCondLst>
+                                        </p:cTn>
+                                        <p:tgtEl>
+                                          <p:spTgt spid="7"/>
+                                        </p:tgtEl>
+                                        <p:attrNameLst>
+                                          <p:attrName>style.visibility</p:attrName>
+                                        </p:attrNameLst>
+                                      </p:cBhvr>
+                                      <p:to>
+                                        <p:strVal val="visible"/>
+                                      </p:to>
+                                    </p:set>
+                                    <p:animEffect transition="in" filter="blinds(horizontal)">
+                                      <p:cBhvr>
+                                        <p:cTn id="34" dur="500"/>
+                                        <p:tgtEl>
+                                          <p:spTgt spid="7"/>
+                                        </p:tgtEl>
+                                      </p:cBhvr>
+                                    </p:animEffect>
+                                  </p:childTnLst>
+                                </p:cTn>
+                              </p:par>
+                              <p:par>
+                                <p:cTn id="35" presetID="3" presetClass="entr" presetSubtype="10" fill="hold" grpId="0" nodeType="withEffect">
+                                  <p:stCondLst>
+                                    <p:cond delay="0"/>
+                                  </p:stCondLst>
+                                  <p:childTnLst>
+                                    <p:set>
+                                      <p:cBhvr>
                                         <p:cTn id="36" dur="1" fill="hold">
                                           <p:stCondLst>
                                             <p:cond delay="0"/>
                                           </p:stCondLst>
                                         </p:cTn>
                                         <p:tgtEl>
-                                          <p:spTgt spid="4"/>
+                                          <p:spTgt spid="8"/>
                                         </p:tgtEl>
                                         <p:attrNameLst>
                                           <p:attrName>style.visibility</p:attrName>
@@ -7148,7 +7600,287 @@
                                       <p:cBhvr>
                                         <p:cTn id="37" dur="500"/>
                                         <p:tgtEl>
-                                          <p:spTgt spid="4"/>
+                                          <p:spTgt spid="8"/>
+                                        </p:tgtEl>
+                                      </p:cBhvr>
+                                    </p:animEffect>
+                                  </p:childTnLst>
+                                </p:cTn>
+                              </p:par>
+                              <p:par>
+                                <p:cTn id="38" presetID="3" presetClass="entr" presetSubtype="10" fill="hold" nodeType="withEffect">
+                                  <p:stCondLst>
+                                    <p:cond delay="0"/>
+                                  </p:stCondLst>
+                                  <p:childTnLst>
+                                    <p:set>
+                                      <p:cBhvr>
+                                        <p:cTn id="39" dur="1" fill="hold">
+                                          <p:stCondLst>
+                                            <p:cond delay="0"/>
+                                          </p:stCondLst>
+                                        </p:cTn>
+                                        <p:tgtEl>
+                                          <p:spTgt spid="10"/>
+                                        </p:tgtEl>
+                                        <p:attrNameLst>
+                                          <p:attrName>style.visibility</p:attrName>
+                                        </p:attrNameLst>
+                                      </p:cBhvr>
+                                      <p:to>
+                                        <p:strVal val="visible"/>
+                                      </p:to>
+                                    </p:set>
+                                    <p:animEffect transition="in" filter="blinds(horizontal)">
+                                      <p:cBhvr>
+                                        <p:cTn id="40" dur="500"/>
+                                        <p:tgtEl>
+                                          <p:spTgt spid="10"/>
+                                        </p:tgtEl>
+                                      </p:cBhvr>
+                                    </p:animEffect>
+                                  </p:childTnLst>
+                                </p:cTn>
+                              </p:par>
+                              <p:par>
+                                <p:cTn id="41" presetID="3" presetClass="entr" presetSubtype="10" fill="hold" nodeType="withEffect">
+                                  <p:stCondLst>
+                                    <p:cond delay="0"/>
+                                  </p:stCondLst>
+                                  <p:childTnLst>
+                                    <p:set>
+                                      <p:cBhvr>
+                                        <p:cTn id="42" dur="1" fill="hold">
+                                          <p:stCondLst>
+                                            <p:cond delay="0"/>
+                                          </p:stCondLst>
+                                        </p:cTn>
+                                        <p:tgtEl>
+                                          <p:spTgt spid="14"/>
+                                        </p:tgtEl>
+                                        <p:attrNameLst>
+                                          <p:attrName>style.visibility</p:attrName>
+                                        </p:attrNameLst>
+                                      </p:cBhvr>
+                                      <p:to>
+                                        <p:strVal val="visible"/>
+                                      </p:to>
+                                    </p:set>
+                                    <p:animEffect transition="in" filter="blinds(horizontal)">
+                                      <p:cBhvr>
+                                        <p:cTn id="43" dur="500"/>
+                                        <p:tgtEl>
+                                          <p:spTgt spid="14"/>
+                                        </p:tgtEl>
+                                      </p:cBhvr>
+                                    </p:animEffect>
+                                  </p:childTnLst>
+                                </p:cTn>
+                              </p:par>
+                              <p:par>
+                                <p:cTn id="44" presetID="3" presetClass="entr" presetSubtype="10" fill="hold" nodeType="withEffect">
+                                  <p:stCondLst>
+                                    <p:cond delay="0"/>
+                                  </p:stCondLst>
+                                  <p:childTnLst>
+                                    <p:set>
+                                      <p:cBhvr>
+                                        <p:cTn id="45" dur="1" fill="hold">
+                                          <p:stCondLst>
+                                            <p:cond delay="0"/>
+                                          </p:stCondLst>
+                                        </p:cTn>
+                                        <p:tgtEl>
+                                          <p:spTgt spid="15"/>
+                                        </p:tgtEl>
+                                        <p:attrNameLst>
+                                          <p:attrName>style.visibility</p:attrName>
+                                        </p:attrNameLst>
+                                      </p:cBhvr>
+                                      <p:to>
+                                        <p:strVal val="visible"/>
+                                      </p:to>
+                                    </p:set>
+                                    <p:animEffect transition="in" filter="blinds(horizontal)">
+                                      <p:cBhvr>
+                                        <p:cTn id="46" dur="500"/>
+                                        <p:tgtEl>
+                                          <p:spTgt spid="15"/>
+                                        </p:tgtEl>
+                                      </p:cBhvr>
+                                    </p:animEffect>
+                                  </p:childTnLst>
+                                </p:cTn>
+                              </p:par>
+                              <p:par>
+                                <p:cTn id="47" presetID="3" presetClass="entr" presetSubtype="10" fill="hold" nodeType="withEffect">
+                                  <p:stCondLst>
+                                    <p:cond delay="0"/>
+                                  </p:stCondLst>
+                                  <p:childTnLst>
+                                    <p:set>
+                                      <p:cBhvr>
+                                        <p:cTn id="48" dur="1" fill="hold">
+                                          <p:stCondLst>
+                                            <p:cond delay="0"/>
+                                          </p:stCondLst>
+                                        </p:cTn>
+                                        <p:tgtEl>
+                                          <p:spTgt spid="16"/>
+                                        </p:tgtEl>
+                                        <p:attrNameLst>
+                                          <p:attrName>style.visibility</p:attrName>
+                                        </p:attrNameLst>
+                                      </p:cBhvr>
+                                      <p:to>
+                                        <p:strVal val="visible"/>
+                                      </p:to>
+                                    </p:set>
+                                    <p:animEffect transition="in" filter="blinds(horizontal)">
+                                      <p:cBhvr>
+                                        <p:cTn id="49" dur="500"/>
+                                        <p:tgtEl>
+                                          <p:spTgt spid="16"/>
+                                        </p:tgtEl>
+                                      </p:cBhvr>
+                                    </p:animEffect>
+                                  </p:childTnLst>
+                                </p:cTn>
+                              </p:par>
+                              <p:par>
+                                <p:cTn id="50" presetID="3" presetClass="entr" presetSubtype="10" fill="hold" grpId="0" nodeType="withEffect">
+                                  <p:stCondLst>
+                                    <p:cond delay="0"/>
+                                  </p:stCondLst>
+                                  <p:childTnLst>
+                                    <p:set>
+                                      <p:cBhvr>
+                                        <p:cTn id="51" dur="1" fill="hold">
+                                          <p:stCondLst>
+                                            <p:cond delay="0"/>
+                                          </p:stCondLst>
+                                        </p:cTn>
+                                        <p:tgtEl>
+                                          <p:spTgt spid="23"/>
+                                        </p:tgtEl>
+                                        <p:attrNameLst>
+                                          <p:attrName>style.visibility</p:attrName>
+                                        </p:attrNameLst>
+                                      </p:cBhvr>
+                                      <p:to>
+                                        <p:strVal val="visible"/>
+                                      </p:to>
+                                    </p:set>
+                                    <p:animEffect transition="in" filter="blinds(horizontal)">
+                                      <p:cBhvr>
+                                        <p:cTn id="52" dur="500"/>
+                                        <p:tgtEl>
+                                          <p:spTgt spid="23"/>
+                                        </p:tgtEl>
+                                      </p:cBhvr>
+                                    </p:animEffect>
+                                  </p:childTnLst>
+                                </p:cTn>
+                              </p:par>
+                              <p:par>
+                                <p:cTn id="53" presetID="3" presetClass="entr" presetSubtype="10" fill="hold" grpId="0" nodeType="withEffect">
+                                  <p:stCondLst>
+                                    <p:cond delay="0"/>
+                                  </p:stCondLst>
+                                  <p:childTnLst>
+                                    <p:set>
+                                      <p:cBhvr>
+                                        <p:cTn id="54" dur="1" fill="hold">
+                                          <p:stCondLst>
+                                            <p:cond delay="0"/>
+                                          </p:stCondLst>
+                                        </p:cTn>
+                                        <p:tgtEl>
+                                          <p:spTgt spid="24"/>
+                                        </p:tgtEl>
+                                        <p:attrNameLst>
+                                          <p:attrName>style.visibility</p:attrName>
+                                        </p:attrNameLst>
+                                      </p:cBhvr>
+                                      <p:to>
+                                        <p:strVal val="visible"/>
+                                      </p:to>
+                                    </p:set>
+                                    <p:animEffect transition="in" filter="blinds(horizontal)">
+                                      <p:cBhvr>
+                                        <p:cTn id="55" dur="500"/>
+                                        <p:tgtEl>
+                                          <p:spTgt spid="24"/>
+                                        </p:tgtEl>
+                                      </p:cBhvr>
+                                    </p:animEffect>
+                                  </p:childTnLst>
+                                </p:cTn>
+                              </p:par>
+                              <p:par>
+                                <p:cTn id="56" presetID="3" presetClass="entr" presetSubtype="10" fill="hold" grpId="0" nodeType="withEffect">
+                                  <p:stCondLst>
+                                    <p:cond delay="0"/>
+                                  </p:stCondLst>
+                                  <p:childTnLst>
+                                    <p:set>
+                                      <p:cBhvr>
+                                        <p:cTn id="57" dur="1" fill="hold">
+                                          <p:stCondLst>
+                                            <p:cond delay="0"/>
+                                          </p:stCondLst>
+                                        </p:cTn>
+                                        <p:tgtEl>
+                                          <p:spTgt spid="25"/>
+                                        </p:tgtEl>
+                                        <p:attrNameLst>
+                                          <p:attrName>style.visibility</p:attrName>
+                                        </p:attrNameLst>
+                                      </p:cBhvr>
+                                      <p:to>
+                                        <p:strVal val="visible"/>
+                                      </p:to>
+                                    </p:set>
+                                    <p:animEffect transition="in" filter="blinds(horizontal)">
+                                      <p:cBhvr>
+                                        <p:cTn id="58" dur="500"/>
+                                        <p:tgtEl>
+                                          <p:spTgt spid="25"/>
+                                        </p:tgtEl>
+                                      </p:cBhvr>
+                                    </p:animEffect>
+                                  </p:childTnLst>
+                                </p:cTn>
+                              </p:par>
+                              <p:par>
+                                <p:cTn id="59" presetID="3" presetClass="entr" presetSubtype="10" fill="hold" grpId="0" nodeType="withEffect">
+                                  <p:stCondLst>
+                                    <p:cond delay="0"/>
+                                  </p:stCondLst>
+                                  <p:childTnLst>
+                                    <p:set>
+                                      <p:cBhvr>
+                                        <p:cTn id="60" dur="1" fill="hold">
+                                          <p:stCondLst>
+                                            <p:cond delay="0"/>
+                                          </p:stCondLst>
+                                        </p:cTn>
+                                        <p:tgtEl>
+                                          <p:spTgt spid="26"/>
+                                        </p:tgtEl>
+                                        <p:attrNameLst>
+                                          <p:attrName>style.visibility</p:attrName>
+                                        </p:attrNameLst>
+                                      </p:cBhvr>
+                                      <p:to>
+                                        <p:strVal val="visible"/>
+                                      </p:to>
+                                    </p:set>
+                                    <p:animEffect transition="in" filter="blinds(horizontal)">
+                                      <p:cBhvr>
+                                        <p:cTn id="61" dur="500"/>
+                                        <p:tgtEl>
+                                          <p:spTgt spid="26"/>
                                         </p:tgtEl>
                                       </p:cBhvr>
                                     </p:animEffect>
@@ -7162,32 +7894,32 @@
                     </p:cTn>
                   </p:par>
                   <p:par>
-                    <p:cTn id="38" fill="hold">
+                    <p:cTn id="62" fill="hold">
                       <p:stCondLst>
                         <p:cond delay="indefinite"/>
                       </p:stCondLst>
                       <p:childTnLst>
                         <p:par>
-                          <p:cTn id="39" fill="hold">
+                          <p:cTn id="63" fill="hold">
                             <p:stCondLst>
                               <p:cond delay="0"/>
                             </p:stCondLst>
                             <p:childTnLst>
                               <p:par>
-                                <p:cTn id="40" presetID="3" presetClass="entr" presetSubtype="10" fill="hold" grpId="0" nodeType="clickEffect">
+                                <p:cTn id="64" presetID="3" presetClass="entr" presetSubtype="10" fill="hold" grpId="0" nodeType="clickEffect">
                                   <p:stCondLst>
                                     <p:cond delay="0"/>
                                   </p:stCondLst>
                                   <p:childTnLst>
                                     <p:set>
                                       <p:cBhvr>
-                                        <p:cTn id="41" dur="1" fill="hold">
+                                        <p:cTn id="65" dur="1" fill="hold">
                                           <p:stCondLst>
                                             <p:cond delay="0"/>
                                           </p:stCondLst>
                                         </p:cTn>
                                         <p:tgtEl>
-                                          <p:spTgt spid="5"/>
+                                          <p:spTgt spid="30"/>
                                         </p:tgtEl>
                                         <p:attrNameLst>
                                           <p:attrName>style.visibility</p:attrName>
@@ -7199,289 +7931,9 @@
                                     </p:set>
                                     <p:animEffect transition="in" filter="blinds(horizontal)">
                                       <p:cBhvr>
-                                        <p:cTn id="42" dur="500"/>
-                                        <p:tgtEl>
-                                          <p:spTgt spid="5"/>
-                                        </p:tgtEl>
-                                      </p:cBhvr>
-                                    </p:animEffect>
-                                  </p:childTnLst>
-                                </p:cTn>
-                              </p:par>
-                              <p:par>
-                                <p:cTn id="43" presetID="3" presetClass="entr" presetSubtype="10" fill="hold" grpId="0" nodeType="withEffect">
-                                  <p:stCondLst>
-                                    <p:cond delay="0"/>
-                                  </p:stCondLst>
-                                  <p:childTnLst>
-                                    <p:set>
-                                      <p:cBhvr>
-                                        <p:cTn id="44" dur="1" fill="hold">
-                                          <p:stCondLst>
-                                            <p:cond delay="0"/>
-                                          </p:stCondLst>
-                                        </p:cTn>
-                                        <p:tgtEl>
-                                          <p:spTgt spid="6"/>
-                                        </p:tgtEl>
-                                        <p:attrNameLst>
-                                          <p:attrName>style.visibility</p:attrName>
-                                        </p:attrNameLst>
-                                      </p:cBhvr>
-                                      <p:to>
-                                        <p:strVal val="visible"/>
-                                      </p:to>
-                                    </p:set>
-                                    <p:animEffect transition="in" filter="blinds(horizontal)">
-                                      <p:cBhvr>
-                                        <p:cTn id="45" dur="500"/>
-                                        <p:tgtEl>
-                                          <p:spTgt spid="6"/>
-                                        </p:tgtEl>
-                                      </p:cBhvr>
-                                    </p:animEffect>
-                                  </p:childTnLst>
-                                </p:cTn>
-                              </p:par>
-                              <p:par>
-                                <p:cTn id="46" presetID="3" presetClass="entr" presetSubtype="10" fill="hold" grpId="0" nodeType="withEffect">
-                                  <p:stCondLst>
-                                    <p:cond delay="0"/>
-                                  </p:stCondLst>
-                                  <p:childTnLst>
-                                    <p:set>
-                                      <p:cBhvr>
-                                        <p:cTn id="47" dur="1" fill="hold">
-                                          <p:stCondLst>
-                                            <p:cond delay="0"/>
-                                          </p:stCondLst>
-                                        </p:cTn>
-                                        <p:tgtEl>
-                                          <p:spTgt spid="7"/>
-                                        </p:tgtEl>
-                                        <p:attrNameLst>
-                                          <p:attrName>style.visibility</p:attrName>
-                                        </p:attrNameLst>
-                                      </p:cBhvr>
-                                      <p:to>
-                                        <p:strVal val="visible"/>
-                                      </p:to>
-                                    </p:set>
-                                    <p:animEffect transition="in" filter="blinds(horizontal)">
-                                      <p:cBhvr>
-                                        <p:cTn id="48" dur="500"/>
-                                        <p:tgtEl>
-                                          <p:spTgt spid="7"/>
-                                        </p:tgtEl>
-                                      </p:cBhvr>
-                                    </p:animEffect>
-                                  </p:childTnLst>
-                                </p:cTn>
-                              </p:par>
-                              <p:par>
-                                <p:cTn id="49" presetID="3" presetClass="entr" presetSubtype="10" fill="hold" grpId="0" nodeType="withEffect">
-                                  <p:stCondLst>
-                                    <p:cond delay="0"/>
-                                  </p:stCondLst>
-                                  <p:childTnLst>
-                                    <p:set>
-                                      <p:cBhvr>
-                                        <p:cTn id="50" dur="1" fill="hold">
-                                          <p:stCondLst>
-                                            <p:cond delay="0"/>
-                                          </p:stCondLst>
-                                        </p:cTn>
-                                        <p:tgtEl>
-                                          <p:spTgt spid="8"/>
-                                        </p:tgtEl>
-                                        <p:attrNameLst>
-                                          <p:attrName>style.visibility</p:attrName>
-                                        </p:attrNameLst>
-                                      </p:cBhvr>
-                                      <p:to>
-                                        <p:strVal val="visible"/>
-                                      </p:to>
-                                    </p:set>
-                                    <p:animEffect transition="in" filter="blinds(horizontal)">
-                                      <p:cBhvr>
-                                        <p:cTn id="51" dur="500"/>
-                                        <p:tgtEl>
-                                          <p:spTgt spid="8"/>
-                                        </p:tgtEl>
-                                      </p:cBhvr>
-                                    </p:animEffect>
-                                  </p:childTnLst>
-                                </p:cTn>
-                              </p:par>
-                              <p:par>
-                                <p:cTn id="52" presetID="3" presetClass="entr" presetSubtype="10" fill="hold" nodeType="withEffect">
-                                  <p:stCondLst>
-                                    <p:cond delay="0"/>
-                                  </p:stCondLst>
-                                  <p:childTnLst>
-                                    <p:set>
-                                      <p:cBhvr>
-                                        <p:cTn id="53" dur="1" fill="hold">
-                                          <p:stCondLst>
-                                            <p:cond delay="0"/>
-                                          </p:stCondLst>
-                                        </p:cTn>
-                                        <p:tgtEl>
-                                          <p:spTgt spid="10"/>
-                                        </p:tgtEl>
-                                        <p:attrNameLst>
-                                          <p:attrName>style.visibility</p:attrName>
-                                        </p:attrNameLst>
-                                      </p:cBhvr>
-                                      <p:to>
-                                        <p:strVal val="visible"/>
-                                      </p:to>
-                                    </p:set>
-                                    <p:animEffect transition="in" filter="blinds(horizontal)">
-                                      <p:cBhvr>
-                                        <p:cTn id="54" dur="500"/>
-                                        <p:tgtEl>
-                                          <p:spTgt spid="10"/>
-                                        </p:tgtEl>
-                                      </p:cBhvr>
-                                    </p:animEffect>
-                                  </p:childTnLst>
-                                </p:cTn>
-                              </p:par>
-                              <p:par>
-                                <p:cTn id="55" presetID="3" presetClass="entr" presetSubtype="10" fill="hold" nodeType="withEffect">
-                                  <p:stCondLst>
-                                    <p:cond delay="0"/>
-                                  </p:stCondLst>
-                                  <p:childTnLst>
-                                    <p:set>
-                                      <p:cBhvr>
-                                        <p:cTn id="56" dur="1" fill="hold">
-                                          <p:stCondLst>
-                                            <p:cond delay="0"/>
-                                          </p:stCondLst>
-                                        </p:cTn>
-                                        <p:tgtEl>
-                                          <p:spTgt spid="14"/>
-                                        </p:tgtEl>
-                                        <p:attrNameLst>
-                                          <p:attrName>style.visibility</p:attrName>
-                                        </p:attrNameLst>
-                                      </p:cBhvr>
-                                      <p:to>
-                                        <p:strVal val="visible"/>
-                                      </p:to>
-                                    </p:set>
-                                    <p:animEffect transition="in" filter="blinds(horizontal)">
-                                      <p:cBhvr>
-                                        <p:cTn id="57" dur="500"/>
-                                        <p:tgtEl>
-                                          <p:spTgt spid="14"/>
-                                        </p:tgtEl>
-                                      </p:cBhvr>
-                                    </p:animEffect>
-                                  </p:childTnLst>
-                                </p:cTn>
-                              </p:par>
-                              <p:par>
-                                <p:cTn id="58" presetID="3" presetClass="entr" presetSubtype="10" fill="hold" nodeType="withEffect">
-                                  <p:stCondLst>
-                                    <p:cond delay="0"/>
-                                  </p:stCondLst>
-                                  <p:childTnLst>
-                                    <p:set>
-                                      <p:cBhvr>
-                                        <p:cTn id="59" dur="1" fill="hold">
-                                          <p:stCondLst>
-                                            <p:cond delay="0"/>
-                                          </p:stCondLst>
-                                        </p:cTn>
-                                        <p:tgtEl>
-                                          <p:spTgt spid="15"/>
-                                        </p:tgtEl>
-                                        <p:attrNameLst>
-                                          <p:attrName>style.visibility</p:attrName>
-                                        </p:attrNameLst>
-                                      </p:cBhvr>
-                                      <p:to>
-                                        <p:strVal val="visible"/>
-                                      </p:to>
-                                    </p:set>
-                                    <p:animEffect transition="in" filter="blinds(horizontal)">
-                                      <p:cBhvr>
-                                        <p:cTn id="60" dur="500"/>
-                                        <p:tgtEl>
-                                          <p:spTgt spid="15"/>
-                                        </p:tgtEl>
-                                      </p:cBhvr>
-                                    </p:animEffect>
-                                  </p:childTnLst>
-                                </p:cTn>
-                              </p:par>
-                              <p:par>
-                                <p:cTn id="61" presetID="3" presetClass="entr" presetSubtype="10" fill="hold" nodeType="withEffect">
-                                  <p:stCondLst>
-                                    <p:cond delay="0"/>
-                                  </p:stCondLst>
-                                  <p:childTnLst>
-                                    <p:set>
-                                      <p:cBhvr>
-                                        <p:cTn id="62" dur="1" fill="hold">
-                                          <p:stCondLst>
-                                            <p:cond delay="0"/>
-                                          </p:stCondLst>
-                                        </p:cTn>
-                                        <p:tgtEl>
-                                          <p:spTgt spid="16"/>
-                                        </p:tgtEl>
-                                        <p:attrNameLst>
-                                          <p:attrName>style.visibility</p:attrName>
-                                        </p:attrNameLst>
-                                      </p:cBhvr>
-                                      <p:to>
-                                        <p:strVal val="visible"/>
-                                      </p:to>
-                                    </p:set>
-                                    <p:animEffect transition="in" filter="blinds(horizontal)">
-                                      <p:cBhvr>
-                                        <p:cTn id="63" dur="500"/>
-                                        <p:tgtEl>
-                                          <p:spTgt spid="16"/>
-                                        </p:tgtEl>
-                                      </p:cBhvr>
-                                    </p:animEffect>
-                                  </p:childTnLst>
-                                </p:cTn>
-                              </p:par>
-                              <p:par>
-                                <p:cTn id="64" presetID="3" presetClass="entr" presetSubtype="10" fill="hold" grpId="0" nodeType="withEffect">
-                                  <p:stCondLst>
-                                    <p:cond delay="0"/>
-                                  </p:stCondLst>
-                                  <p:childTnLst>
-                                    <p:set>
-                                      <p:cBhvr>
-                                        <p:cTn id="65" dur="1" fill="hold">
-                                          <p:stCondLst>
-                                            <p:cond delay="0"/>
-                                          </p:stCondLst>
-                                        </p:cTn>
-                                        <p:tgtEl>
-                                          <p:spTgt spid="23"/>
-                                        </p:tgtEl>
-                                        <p:attrNameLst>
-                                          <p:attrName>style.visibility</p:attrName>
-                                        </p:attrNameLst>
-                                      </p:cBhvr>
-                                      <p:to>
-                                        <p:strVal val="visible"/>
-                                      </p:to>
-                                    </p:set>
-                                    <p:animEffect transition="in" filter="blinds(horizontal)">
-                                      <p:cBhvr>
                                         <p:cTn id="66" dur="500"/>
                                         <p:tgtEl>
-                                          <p:spTgt spid="23"/>
+                                          <p:spTgt spid="30"/>
                                         </p:tgtEl>
                                       </p:cBhvr>
                                     </p:animEffect>
@@ -7502,7 +7954,7 @@
                                           </p:stCondLst>
                                         </p:cTn>
                                         <p:tgtEl>
-                                          <p:spTgt spid="24"/>
+                                          <p:spTgt spid="31"/>
                                         </p:tgtEl>
                                         <p:attrNameLst>
                                           <p:attrName>style.visibility</p:attrName>
@@ -7516,7 +7968,7 @@
                                       <p:cBhvr>
                                         <p:cTn id="69" dur="500"/>
                                         <p:tgtEl>
-                                          <p:spTgt spid="24"/>
+                                          <p:spTgt spid="31"/>
                                         </p:tgtEl>
                                       </p:cBhvr>
                                     </p:animEffect>
@@ -7537,7 +7989,7 @@
                                           </p:stCondLst>
                                         </p:cTn>
                                         <p:tgtEl>
-                                          <p:spTgt spid="25"/>
+                                          <p:spTgt spid="32"/>
                                         </p:tgtEl>
                                         <p:attrNameLst>
                                           <p:attrName>style.visibility</p:attrName>
@@ -7551,7 +8003,7 @@
                                       <p:cBhvr>
                                         <p:cTn id="72" dur="500"/>
                                         <p:tgtEl>
-                                          <p:spTgt spid="25"/>
+                                          <p:spTgt spid="32"/>
                                         </p:tgtEl>
                                       </p:cBhvr>
                                     </p:animEffect>
@@ -7572,7 +8024,7 @@
                                           </p:stCondLst>
                                         </p:cTn>
                                         <p:tgtEl>
-                                          <p:spTgt spid="26"/>
+                                          <p:spTgt spid="38"/>
                                         </p:tgtEl>
                                         <p:attrNameLst>
                                           <p:attrName>style.visibility</p:attrName>
@@ -7586,7 +8038,287 @@
                                       <p:cBhvr>
                                         <p:cTn id="75" dur="500"/>
                                         <p:tgtEl>
-                                          <p:spTgt spid="26"/>
+                                          <p:spTgt spid="38"/>
+                                        </p:tgtEl>
+                                      </p:cBhvr>
+                                    </p:animEffect>
+                                  </p:childTnLst>
+                                </p:cTn>
+                              </p:par>
+                              <p:par>
+                                <p:cTn id="76" presetID="3" presetClass="entr" presetSubtype="10" fill="hold" grpId="0" nodeType="withEffect">
+                                  <p:stCondLst>
+                                    <p:cond delay="0"/>
+                                  </p:stCondLst>
+                                  <p:childTnLst>
+                                    <p:set>
+                                      <p:cBhvr>
+                                        <p:cTn id="77" dur="1" fill="hold">
+                                          <p:stCondLst>
+                                            <p:cond delay="0"/>
+                                          </p:stCondLst>
+                                        </p:cTn>
+                                        <p:tgtEl>
+                                          <p:spTgt spid="39"/>
+                                        </p:tgtEl>
+                                        <p:attrNameLst>
+                                          <p:attrName>style.visibility</p:attrName>
+                                        </p:attrNameLst>
+                                      </p:cBhvr>
+                                      <p:to>
+                                        <p:strVal val="visible"/>
+                                      </p:to>
+                                    </p:set>
+                                    <p:animEffect transition="in" filter="blinds(horizontal)">
+                                      <p:cBhvr>
+                                        <p:cTn id="78" dur="500"/>
+                                        <p:tgtEl>
+                                          <p:spTgt spid="39"/>
+                                        </p:tgtEl>
+                                      </p:cBhvr>
+                                    </p:animEffect>
+                                  </p:childTnLst>
+                                </p:cTn>
+                              </p:par>
+                              <p:par>
+                                <p:cTn id="79" presetID="3" presetClass="entr" presetSubtype="10" fill="hold" grpId="0" nodeType="withEffect">
+                                  <p:stCondLst>
+                                    <p:cond delay="0"/>
+                                  </p:stCondLst>
+                                  <p:childTnLst>
+                                    <p:set>
+                                      <p:cBhvr>
+                                        <p:cTn id="80" dur="1" fill="hold">
+                                          <p:stCondLst>
+                                            <p:cond delay="0"/>
+                                          </p:stCondLst>
+                                        </p:cTn>
+                                        <p:tgtEl>
+                                          <p:spTgt spid="40"/>
+                                        </p:tgtEl>
+                                        <p:attrNameLst>
+                                          <p:attrName>style.visibility</p:attrName>
+                                        </p:attrNameLst>
+                                      </p:cBhvr>
+                                      <p:to>
+                                        <p:strVal val="visible"/>
+                                      </p:to>
+                                    </p:set>
+                                    <p:animEffect transition="in" filter="blinds(horizontal)">
+                                      <p:cBhvr>
+                                        <p:cTn id="81" dur="500"/>
+                                        <p:tgtEl>
+                                          <p:spTgt spid="40"/>
+                                        </p:tgtEl>
+                                      </p:cBhvr>
+                                    </p:animEffect>
+                                  </p:childTnLst>
+                                </p:cTn>
+                              </p:par>
+                              <p:par>
+                                <p:cTn id="82" presetID="3" presetClass="entr" presetSubtype="10" fill="hold" grpId="0" nodeType="withEffect">
+                                  <p:stCondLst>
+                                    <p:cond delay="0"/>
+                                  </p:stCondLst>
+                                  <p:childTnLst>
+                                    <p:set>
+                                      <p:cBhvr>
+                                        <p:cTn id="83" dur="1" fill="hold">
+                                          <p:stCondLst>
+                                            <p:cond delay="0"/>
+                                          </p:stCondLst>
+                                        </p:cTn>
+                                        <p:tgtEl>
+                                          <p:spTgt spid="41"/>
+                                        </p:tgtEl>
+                                        <p:attrNameLst>
+                                          <p:attrName>style.visibility</p:attrName>
+                                        </p:attrNameLst>
+                                      </p:cBhvr>
+                                      <p:to>
+                                        <p:strVal val="visible"/>
+                                      </p:to>
+                                    </p:set>
+                                    <p:animEffect transition="in" filter="blinds(horizontal)">
+                                      <p:cBhvr>
+                                        <p:cTn id="84" dur="500"/>
+                                        <p:tgtEl>
+                                          <p:spTgt spid="41"/>
+                                        </p:tgtEl>
+                                      </p:cBhvr>
+                                    </p:animEffect>
+                                  </p:childTnLst>
+                                </p:cTn>
+                              </p:par>
+                              <p:par>
+                                <p:cTn id="85" presetID="3" presetClass="entr" presetSubtype="10" fill="hold" nodeType="withEffect">
+                                  <p:stCondLst>
+                                    <p:cond delay="0"/>
+                                  </p:stCondLst>
+                                  <p:childTnLst>
+                                    <p:set>
+                                      <p:cBhvr>
+                                        <p:cTn id="86" dur="1" fill="hold">
+                                          <p:stCondLst>
+                                            <p:cond delay="0"/>
+                                          </p:stCondLst>
+                                        </p:cTn>
+                                        <p:tgtEl>
+                                          <p:spTgt spid="42"/>
+                                        </p:tgtEl>
+                                        <p:attrNameLst>
+                                          <p:attrName>style.visibility</p:attrName>
+                                        </p:attrNameLst>
+                                      </p:cBhvr>
+                                      <p:to>
+                                        <p:strVal val="visible"/>
+                                      </p:to>
+                                    </p:set>
+                                    <p:animEffect transition="in" filter="blinds(horizontal)">
+                                      <p:cBhvr>
+                                        <p:cTn id="87" dur="500"/>
+                                        <p:tgtEl>
+                                          <p:spTgt spid="42"/>
+                                        </p:tgtEl>
+                                      </p:cBhvr>
+                                    </p:animEffect>
+                                  </p:childTnLst>
+                                </p:cTn>
+                              </p:par>
+                              <p:par>
+                                <p:cTn id="88" presetID="3" presetClass="entr" presetSubtype="10" fill="hold" nodeType="withEffect">
+                                  <p:stCondLst>
+                                    <p:cond delay="0"/>
+                                  </p:stCondLst>
+                                  <p:childTnLst>
+                                    <p:set>
+                                      <p:cBhvr>
+                                        <p:cTn id="89" dur="1" fill="hold">
+                                          <p:stCondLst>
+                                            <p:cond delay="0"/>
+                                          </p:stCondLst>
+                                        </p:cTn>
+                                        <p:tgtEl>
+                                          <p:spTgt spid="47"/>
+                                        </p:tgtEl>
+                                        <p:attrNameLst>
+                                          <p:attrName>style.visibility</p:attrName>
+                                        </p:attrNameLst>
+                                      </p:cBhvr>
+                                      <p:to>
+                                        <p:strVal val="visible"/>
+                                      </p:to>
+                                    </p:set>
+                                    <p:animEffect transition="in" filter="blinds(horizontal)">
+                                      <p:cBhvr>
+                                        <p:cTn id="90" dur="500"/>
+                                        <p:tgtEl>
+                                          <p:spTgt spid="47"/>
+                                        </p:tgtEl>
+                                      </p:cBhvr>
+                                    </p:animEffect>
+                                  </p:childTnLst>
+                                </p:cTn>
+                              </p:par>
+                              <p:par>
+                                <p:cTn id="91" presetID="3" presetClass="entr" presetSubtype="10" fill="hold" nodeType="withEffect">
+                                  <p:stCondLst>
+                                    <p:cond delay="0"/>
+                                  </p:stCondLst>
+                                  <p:childTnLst>
+                                    <p:set>
+                                      <p:cBhvr>
+                                        <p:cTn id="92" dur="1" fill="hold">
+                                          <p:stCondLst>
+                                            <p:cond delay="0"/>
+                                          </p:stCondLst>
+                                        </p:cTn>
+                                        <p:tgtEl>
+                                          <p:spTgt spid="50"/>
+                                        </p:tgtEl>
+                                        <p:attrNameLst>
+                                          <p:attrName>style.visibility</p:attrName>
+                                        </p:attrNameLst>
+                                      </p:cBhvr>
+                                      <p:to>
+                                        <p:strVal val="visible"/>
+                                      </p:to>
+                                    </p:set>
+                                    <p:animEffect transition="in" filter="blinds(horizontal)">
+                                      <p:cBhvr>
+                                        <p:cTn id="93" dur="500"/>
+                                        <p:tgtEl>
+                                          <p:spTgt spid="50"/>
+                                        </p:tgtEl>
+                                      </p:cBhvr>
+                                    </p:animEffect>
+                                  </p:childTnLst>
+                                </p:cTn>
+                              </p:par>
+                              <p:par>
+                                <p:cTn id="94" presetID="3" presetClass="entr" presetSubtype="10" fill="hold" nodeType="withEffect">
+                                  <p:stCondLst>
+                                    <p:cond delay="0"/>
+                                  </p:stCondLst>
+                                  <p:childTnLst>
+                                    <p:set>
+                                      <p:cBhvr>
+                                        <p:cTn id="95" dur="1" fill="hold">
+                                          <p:stCondLst>
+                                            <p:cond delay="0"/>
+                                          </p:stCondLst>
+                                        </p:cTn>
+                                        <p:tgtEl>
+                                          <p:spTgt spid="54"/>
+                                        </p:tgtEl>
+                                        <p:attrNameLst>
+                                          <p:attrName>style.visibility</p:attrName>
+                                        </p:attrNameLst>
+                                      </p:cBhvr>
+                                      <p:to>
+                                        <p:strVal val="visible"/>
+                                      </p:to>
+                                    </p:set>
+                                    <p:animEffect transition="in" filter="blinds(horizontal)">
+                                      <p:cBhvr>
+                                        <p:cTn id="96" dur="500"/>
+                                        <p:tgtEl>
+                                          <p:spTgt spid="54"/>
+                                        </p:tgtEl>
+                                      </p:cBhvr>
+                                    </p:animEffect>
+                                  </p:childTnLst>
+                                </p:cTn>
+                              </p:par>
+                              <p:par>
+                                <p:cTn id="97" presetID="3" presetClass="entr" presetSubtype="10" fill="hold" grpId="0" nodeType="withEffect">
+                                  <p:stCondLst>
+                                    <p:cond delay="0"/>
+                                  </p:stCondLst>
+                                  <p:childTnLst>
+                                    <p:set>
+                                      <p:cBhvr>
+                                        <p:cTn id="98" dur="1" fill="hold">
+                                          <p:stCondLst>
+                                            <p:cond delay="0"/>
+                                          </p:stCondLst>
+                                        </p:cTn>
+                                        <p:tgtEl>
+                                          <p:spTgt spid="61"/>
+                                        </p:tgtEl>
+                                        <p:attrNameLst>
+                                          <p:attrName>style.visibility</p:attrName>
+                                        </p:attrNameLst>
+                                      </p:cBhvr>
+                                      <p:to>
+                                        <p:strVal val="visible"/>
+                                      </p:to>
+                                    </p:set>
+                                    <p:animEffect transition="in" filter="blinds(horizontal)">
+                                      <p:cBhvr>
+                                        <p:cTn id="99" dur="500"/>
+                                        <p:tgtEl>
+                                          <p:spTgt spid="61"/>
                                         </p:tgtEl>
                                       </p:cBhvr>
                                     </p:animEffect>
@@ -7600,32 +8332,32 @@
                     </p:cTn>
                   </p:par>
                   <p:par>
-                    <p:cTn id="76" fill="hold">
+                    <p:cTn id="100" fill="hold">
                       <p:stCondLst>
                         <p:cond delay="indefinite"/>
                       </p:stCondLst>
                       <p:childTnLst>
                         <p:par>
-                          <p:cTn id="77" fill="hold">
+                          <p:cTn id="101" fill="hold">
                             <p:stCondLst>
                               <p:cond delay="0"/>
                             </p:stCondLst>
                             <p:childTnLst>
                               <p:par>
-                                <p:cTn id="78" presetID="3" presetClass="entr" presetSubtype="10" fill="hold" grpId="0" nodeType="clickEffect">
+                                <p:cTn id="102" presetID="3" presetClass="entr" presetSubtype="10" fill="hold" grpId="0" nodeType="clickEffect">
                                   <p:stCondLst>
                                     <p:cond delay="0"/>
                                   </p:stCondLst>
                                   <p:childTnLst>
                                     <p:set>
                                       <p:cBhvr>
-                                        <p:cTn id="79" dur="1" fill="hold">
+                                        <p:cTn id="103" dur="1" fill="hold">
                                           <p:stCondLst>
                                             <p:cond delay="0"/>
                                           </p:stCondLst>
                                         </p:cTn>
                                         <p:tgtEl>
-                                          <p:spTgt spid="30"/>
+                                          <p:spTgt spid="62"/>
                                         </p:tgtEl>
                                         <p:attrNameLst>
                                           <p:attrName>style.visibility</p:attrName>
@@ -7637,9 +8369,9 @@
                                     </p:set>
                                     <p:animEffect transition="in" filter="blinds(horizontal)">
                                       <p:cBhvr>
-                                        <p:cTn id="80" dur="500"/>
-                                        <p:tgtEl>
-                                          <p:spTgt spid="30"/>
+                                        <p:cTn id="104" dur="500"/>
+                                        <p:tgtEl>
+                                          <p:spTgt spid="62"/>
                                         </p:tgtEl>
                                       </p:cBhvr>
                                     </p:animEffect>
@@ -7647,20 +8379,20 @@
                                 </p:cTn>
                               </p:par>
                               <p:par>
-                                <p:cTn id="81" presetID="3" presetClass="entr" presetSubtype="10" fill="hold" grpId="0" nodeType="withEffect">
+                                <p:cTn id="105" presetID="3" presetClass="entr" presetSubtype="10" fill="hold" grpId="0" nodeType="withEffect">
                                   <p:stCondLst>
                                     <p:cond delay="0"/>
                                   </p:stCondLst>
                                   <p:childTnLst>
                                     <p:set>
                                       <p:cBhvr>
-                                        <p:cTn id="82" dur="1" fill="hold">
+                                        <p:cTn id="106" dur="1" fill="hold">
                                           <p:stCondLst>
                                             <p:cond delay="0"/>
                                           </p:stCondLst>
                                         </p:cTn>
                                         <p:tgtEl>
-                                          <p:spTgt spid="31"/>
+                                          <p:spTgt spid="63"/>
                                         </p:tgtEl>
                                         <p:attrNameLst>
                                           <p:attrName>style.visibility</p:attrName>
@@ -7672,9 +8404,9 @@
                                     </p:set>
                                     <p:animEffect transition="in" filter="blinds(horizontal)">
                                       <p:cBhvr>
-                                        <p:cTn id="83" dur="500"/>
-                                        <p:tgtEl>
-                                          <p:spTgt spid="31"/>
+                                        <p:cTn id="107" dur="500"/>
+                                        <p:tgtEl>
+                                          <p:spTgt spid="63"/>
                                         </p:tgtEl>
                                       </p:cBhvr>
                                     </p:animEffect>
@@ -7682,20 +8414,20 @@
                                 </p:cTn>
                               </p:par>
                               <p:par>
-                                <p:cTn id="84" presetID="3" presetClass="entr" presetSubtype="10" fill="hold" grpId="0" nodeType="withEffect">
+                                <p:cTn id="108" presetID="3" presetClass="entr" presetSubtype="10" fill="hold" grpId="0" nodeType="withEffect">
                                   <p:stCondLst>
                                     <p:cond delay="0"/>
                                   </p:stCondLst>
                                   <p:childTnLst>
                                     <p:set>
                                       <p:cBhvr>
-                                        <p:cTn id="85" dur="1" fill="hold">
+                                        <p:cTn id="109" dur="1" fill="hold">
                                           <p:stCondLst>
                                             <p:cond delay="0"/>
                                           </p:stCondLst>
                                         </p:cTn>
                                         <p:tgtEl>
-                                          <p:spTgt spid="32"/>
+                                          <p:spTgt spid="64"/>
                                         </p:tgtEl>
                                         <p:attrNameLst>
                                           <p:attrName>style.visibility</p:attrName>
@@ -7707,289 +8439,9 @@
                                     </p:set>
                                     <p:animEffect transition="in" filter="blinds(horizontal)">
                                       <p:cBhvr>
-                                        <p:cTn id="86" dur="500"/>
-                                        <p:tgtEl>
-                                          <p:spTgt spid="32"/>
-                                        </p:tgtEl>
-                                      </p:cBhvr>
-                                    </p:animEffect>
-                                  </p:childTnLst>
-                                </p:cTn>
-                              </p:par>
-                              <p:par>
-                                <p:cTn id="87" presetID="3" presetClass="entr" presetSubtype="10" fill="hold" grpId="0" nodeType="withEffect">
-                                  <p:stCondLst>
-                                    <p:cond delay="0"/>
-                                  </p:stCondLst>
-                                  <p:childTnLst>
-                                    <p:set>
-                                      <p:cBhvr>
-                                        <p:cTn id="88" dur="1" fill="hold">
-                                          <p:stCondLst>
-                                            <p:cond delay="0"/>
-                                          </p:stCondLst>
-                                        </p:cTn>
-                                        <p:tgtEl>
-                                          <p:spTgt spid="38"/>
-                                        </p:tgtEl>
-                                        <p:attrNameLst>
-                                          <p:attrName>style.visibility</p:attrName>
-                                        </p:attrNameLst>
-                                      </p:cBhvr>
-                                      <p:to>
-                                        <p:strVal val="visible"/>
-                                      </p:to>
-                                    </p:set>
-                                    <p:animEffect transition="in" filter="blinds(horizontal)">
-                                      <p:cBhvr>
-                                        <p:cTn id="89" dur="500"/>
-                                        <p:tgtEl>
-                                          <p:spTgt spid="38"/>
-                                        </p:tgtEl>
-                                      </p:cBhvr>
-                                    </p:animEffect>
-                                  </p:childTnLst>
-                                </p:cTn>
-                              </p:par>
-                              <p:par>
-                                <p:cTn id="90" presetID="3" presetClass="entr" presetSubtype="10" fill="hold" grpId="0" nodeType="withEffect">
-                                  <p:stCondLst>
-                                    <p:cond delay="0"/>
-                                  </p:stCondLst>
-                                  <p:childTnLst>
-                                    <p:set>
-                                      <p:cBhvr>
-                                        <p:cTn id="91" dur="1" fill="hold">
-                                          <p:stCondLst>
-                                            <p:cond delay="0"/>
-                                          </p:stCondLst>
-                                        </p:cTn>
-                                        <p:tgtEl>
-                                          <p:spTgt spid="39"/>
-                                        </p:tgtEl>
-                                        <p:attrNameLst>
-                                          <p:attrName>style.visibility</p:attrName>
-                                        </p:attrNameLst>
-                                      </p:cBhvr>
-                                      <p:to>
-                                        <p:strVal val="visible"/>
-                                      </p:to>
-                                    </p:set>
-                                    <p:animEffect transition="in" filter="blinds(horizontal)">
-                                      <p:cBhvr>
-                                        <p:cTn id="92" dur="500"/>
-                                        <p:tgtEl>
-                                          <p:spTgt spid="39"/>
-                                        </p:tgtEl>
-                                      </p:cBhvr>
-                                    </p:animEffect>
-                                  </p:childTnLst>
-                                </p:cTn>
-                              </p:par>
-                              <p:par>
-                                <p:cTn id="93" presetID="3" presetClass="entr" presetSubtype="10" fill="hold" grpId="0" nodeType="withEffect">
-                                  <p:stCondLst>
-                                    <p:cond delay="0"/>
-                                  </p:stCondLst>
-                                  <p:childTnLst>
-                                    <p:set>
-                                      <p:cBhvr>
-                                        <p:cTn id="94" dur="1" fill="hold">
-                                          <p:stCondLst>
-                                            <p:cond delay="0"/>
-                                          </p:stCondLst>
-                                        </p:cTn>
-                                        <p:tgtEl>
-                                          <p:spTgt spid="40"/>
-                                        </p:tgtEl>
-                                        <p:attrNameLst>
-                                          <p:attrName>style.visibility</p:attrName>
-                                        </p:attrNameLst>
-                                      </p:cBhvr>
-                                      <p:to>
-                                        <p:strVal val="visible"/>
-                                      </p:to>
-                                    </p:set>
-                                    <p:animEffect transition="in" filter="blinds(horizontal)">
-                                      <p:cBhvr>
-                                        <p:cTn id="95" dur="500"/>
-                                        <p:tgtEl>
-                                          <p:spTgt spid="40"/>
-                                        </p:tgtEl>
-                                      </p:cBhvr>
-                                    </p:animEffect>
-                                  </p:childTnLst>
-                                </p:cTn>
-                              </p:par>
-                              <p:par>
-                                <p:cTn id="96" presetID="3" presetClass="entr" presetSubtype="10" fill="hold" grpId="0" nodeType="withEffect">
-                                  <p:stCondLst>
-                                    <p:cond delay="0"/>
-                                  </p:stCondLst>
-                                  <p:childTnLst>
-                                    <p:set>
-                                      <p:cBhvr>
-                                        <p:cTn id="97" dur="1" fill="hold">
-                                          <p:stCondLst>
-                                            <p:cond delay="0"/>
-                                          </p:stCondLst>
-                                        </p:cTn>
-                                        <p:tgtEl>
-                                          <p:spTgt spid="41"/>
-                                        </p:tgtEl>
-                                        <p:attrNameLst>
-                                          <p:attrName>style.visibility</p:attrName>
-                                        </p:attrNameLst>
-                                      </p:cBhvr>
-                                      <p:to>
-                                        <p:strVal val="visible"/>
-                                      </p:to>
-                                    </p:set>
-                                    <p:animEffect transition="in" filter="blinds(horizontal)">
-                                      <p:cBhvr>
-                                        <p:cTn id="98" dur="500"/>
-                                        <p:tgtEl>
-                                          <p:spTgt spid="41"/>
-                                        </p:tgtEl>
-                                      </p:cBhvr>
-                                    </p:animEffect>
-                                  </p:childTnLst>
-                                </p:cTn>
-                              </p:par>
-                              <p:par>
-                                <p:cTn id="99" presetID="3" presetClass="entr" presetSubtype="10" fill="hold" nodeType="withEffect">
-                                  <p:stCondLst>
-                                    <p:cond delay="0"/>
-                                  </p:stCondLst>
-                                  <p:childTnLst>
-                                    <p:set>
-                                      <p:cBhvr>
-                                        <p:cTn id="100" dur="1" fill="hold">
-                                          <p:stCondLst>
-                                            <p:cond delay="0"/>
-                                          </p:stCondLst>
-                                        </p:cTn>
-                                        <p:tgtEl>
-                                          <p:spTgt spid="42"/>
-                                        </p:tgtEl>
-                                        <p:attrNameLst>
-                                          <p:attrName>style.visibility</p:attrName>
-                                        </p:attrNameLst>
-                                      </p:cBhvr>
-                                      <p:to>
-                                        <p:strVal val="visible"/>
-                                      </p:to>
-                                    </p:set>
-                                    <p:animEffect transition="in" filter="blinds(horizontal)">
-                                      <p:cBhvr>
-                                        <p:cTn id="101" dur="500"/>
-                                        <p:tgtEl>
-                                          <p:spTgt spid="42"/>
-                                        </p:tgtEl>
-                                      </p:cBhvr>
-                                    </p:animEffect>
-                                  </p:childTnLst>
-                                </p:cTn>
-                              </p:par>
-                              <p:par>
-                                <p:cTn id="102" presetID="3" presetClass="entr" presetSubtype="10" fill="hold" nodeType="withEffect">
-                                  <p:stCondLst>
-                                    <p:cond delay="0"/>
-                                  </p:stCondLst>
-                                  <p:childTnLst>
-                                    <p:set>
-                                      <p:cBhvr>
-                                        <p:cTn id="103" dur="1" fill="hold">
-                                          <p:stCondLst>
-                                            <p:cond delay="0"/>
-                                          </p:stCondLst>
-                                        </p:cTn>
-                                        <p:tgtEl>
-                                          <p:spTgt spid="47"/>
-                                        </p:tgtEl>
-                                        <p:attrNameLst>
-                                          <p:attrName>style.visibility</p:attrName>
-                                        </p:attrNameLst>
-                                      </p:cBhvr>
-                                      <p:to>
-                                        <p:strVal val="visible"/>
-                                      </p:to>
-                                    </p:set>
-                                    <p:animEffect transition="in" filter="blinds(horizontal)">
-                                      <p:cBhvr>
-                                        <p:cTn id="104" dur="500"/>
-                                        <p:tgtEl>
-                                          <p:spTgt spid="47"/>
-                                        </p:tgtEl>
-                                      </p:cBhvr>
-                                    </p:animEffect>
-                                  </p:childTnLst>
-                                </p:cTn>
-                              </p:par>
-                              <p:par>
-                                <p:cTn id="105" presetID="3" presetClass="entr" presetSubtype="10" fill="hold" nodeType="withEffect">
-                                  <p:stCondLst>
-                                    <p:cond delay="0"/>
-                                  </p:stCondLst>
-                                  <p:childTnLst>
-                                    <p:set>
-                                      <p:cBhvr>
-                                        <p:cTn id="106" dur="1" fill="hold">
-                                          <p:stCondLst>
-                                            <p:cond delay="0"/>
-                                          </p:stCondLst>
-                                        </p:cTn>
-                                        <p:tgtEl>
-                                          <p:spTgt spid="50"/>
-                                        </p:tgtEl>
-                                        <p:attrNameLst>
-                                          <p:attrName>style.visibility</p:attrName>
-                                        </p:attrNameLst>
-                                      </p:cBhvr>
-                                      <p:to>
-                                        <p:strVal val="visible"/>
-                                      </p:to>
-                                    </p:set>
-                                    <p:animEffect transition="in" filter="blinds(horizontal)">
-                                      <p:cBhvr>
-                                        <p:cTn id="107" dur="500"/>
-                                        <p:tgtEl>
-                                          <p:spTgt spid="50"/>
-                                        </p:tgtEl>
-                                      </p:cBhvr>
-                                    </p:animEffect>
-                                  </p:childTnLst>
-                                </p:cTn>
-                              </p:par>
-                              <p:par>
-                                <p:cTn id="108" presetID="3" presetClass="entr" presetSubtype="10" fill="hold" nodeType="withEffect">
-                                  <p:stCondLst>
-                                    <p:cond delay="0"/>
-                                  </p:stCondLst>
-                                  <p:childTnLst>
-                                    <p:set>
-                                      <p:cBhvr>
-                                        <p:cTn id="109" dur="1" fill="hold">
-                                          <p:stCondLst>
-                                            <p:cond delay="0"/>
-                                          </p:stCondLst>
-                                        </p:cTn>
-                                        <p:tgtEl>
-                                          <p:spTgt spid="54"/>
-                                        </p:tgtEl>
-                                        <p:attrNameLst>
-                                          <p:attrName>style.visibility</p:attrName>
-                                        </p:attrNameLst>
-                                      </p:cBhvr>
-                                      <p:to>
-                                        <p:strVal val="visible"/>
-                                      </p:to>
-                                    </p:set>
-                                    <p:animEffect transition="in" filter="blinds(horizontal)">
-                                      <p:cBhvr>
                                         <p:cTn id="110" dur="500"/>
                                         <p:tgtEl>
-                                          <p:spTgt spid="54"/>
+                                          <p:spTgt spid="64"/>
                                         </p:tgtEl>
                                       </p:cBhvr>
                                     </p:animEffect>
@@ -8010,7 +8462,7 @@
                                           </p:stCondLst>
                                         </p:cTn>
                                         <p:tgtEl>
-                                          <p:spTgt spid="61"/>
+                                          <p:spTgt spid="65"/>
                                         </p:tgtEl>
                                         <p:attrNameLst>
                                           <p:attrName>style.visibility</p:attrName>
@@ -8024,7 +8476,287 @@
                                       <p:cBhvr>
                                         <p:cTn id="113" dur="500"/>
                                         <p:tgtEl>
-                                          <p:spTgt spid="61"/>
+                                          <p:spTgt spid="65"/>
+                                        </p:tgtEl>
+                                      </p:cBhvr>
+                                    </p:animEffect>
+                                  </p:childTnLst>
+                                </p:cTn>
+                              </p:par>
+                              <p:par>
+                                <p:cTn id="114" presetID="3" presetClass="entr" presetSubtype="10" fill="hold" grpId="0" nodeType="withEffect">
+                                  <p:stCondLst>
+                                    <p:cond delay="0"/>
+                                  </p:stCondLst>
+                                  <p:childTnLst>
+                                    <p:set>
+                                      <p:cBhvr>
+                                        <p:cTn id="115" dur="1" fill="hold">
+                                          <p:stCondLst>
+                                            <p:cond delay="0"/>
+                                          </p:stCondLst>
+                                        </p:cTn>
+                                        <p:tgtEl>
+                                          <p:spTgt spid="70"/>
+                                        </p:tgtEl>
+                                        <p:attrNameLst>
+                                          <p:attrName>style.visibility</p:attrName>
+                                        </p:attrNameLst>
+                                      </p:cBhvr>
+                                      <p:to>
+                                        <p:strVal val="visible"/>
+                                      </p:to>
+                                    </p:set>
+                                    <p:animEffect transition="in" filter="blinds(horizontal)">
+                                      <p:cBhvr>
+                                        <p:cTn id="116" dur="500"/>
+                                        <p:tgtEl>
+                                          <p:spTgt spid="70"/>
+                                        </p:tgtEl>
+                                      </p:cBhvr>
+                                    </p:animEffect>
+                                  </p:childTnLst>
+                                </p:cTn>
+                              </p:par>
+                              <p:par>
+                                <p:cTn id="117" presetID="3" presetClass="entr" presetSubtype="10" fill="hold" grpId="0" nodeType="withEffect">
+                                  <p:stCondLst>
+                                    <p:cond delay="0"/>
+                                  </p:stCondLst>
+                                  <p:childTnLst>
+                                    <p:set>
+                                      <p:cBhvr>
+                                        <p:cTn id="118" dur="1" fill="hold">
+                                          <p:stCondLst>
+                                            <p:cond delay="0"/>
+                                          </p:stCondLst>
+                                        </p:cTn>
+                                        <p:tgtEl>
+                                          <p:spTgt spid="71"/>
+                                        </p:tgtEl>
+                                        <p:attrNameLst>
+                                          <p:attrName>style.visibility</p:attrName>
+                                        </p:attrNameLst>
+                                      </p:cBhvr>
+                                      <p:to>
+                                        <p:strVal val="visible"/>
+                                      </p:to>
+                                    </p:set>
+                                    <p:animEffect transition="in" filter="blinds(horizontal)">
+                                      <p:cBhvr>
+                                        <p:cTn id="119" dur="500"/>
+                                        <p:tgtEl>
+                                          <p:spTgt spid="71"/>
+                                        </p:tgtEl>
+                                      </p:cBhvr>
+                                    </p:animEffect>
+                                  </p:childTnLst>
+                                </p:cTn>
+                              </p:par>
+                              <p:par>
+                                <p:cTn id="120" presetID="3" presetClass="entr" presetSubtype="10" fill="hold" grpId="0" nodeType="withEffect">
+                                  <p:stCondLst>
+                                    <p:cond delay="0"/>
+                                  </p:stCondLst>
+                                  <p:childTnLst>
+                                    <p:set>
+                                      <p:cBhvr>
+                                        <p:cTn id="121" dur="1" fill="hold">
+                                          <p:stCondLst>
+                                            <p:cond delay="0"/>
+                                          </p:stCondLst>
+                                        </p:cTn>
+                                        <p:tgtEl>
+                                          <p:spTgt spid="72"/>
+                                        </p:tgtEl>
+                                        <p:attrNameLst>
+                                          <p:attrName>style.visibility</p:attrName>
+                                        </p:attrNameLst>
+                                      </p:cBhvr>
+                                      <p:to>
+                                        <p:strVal val="visible"/>
+                                      </p:to>
+                                    </p:set>
+                                    <p:animEffect transition="in" filter="blinds(horizontal)">
+                                      <p:cBhvr>
+                                        <p:cTn id="122" dur="500"/>
+                                        <p:tgtEl>
+                                          <p:spTgt spid="72"/>
+                                        </p:tgtEl>
+                                      </p:cBhvr>
+                                    </p:animEffect>
+                                  </p:childTnLst>
+                                </p:cTn>
+                              </p:par>
+                              <p:par>
+                                <p:cTn id="123" presetID="3" presetClass="entr" presetSubtype="10" fill="hold" grpId="0" nodeType="withEffect">
+                                  <p:stCondLst>
+                                    <p:cond delay="0"/>
+                                  </p:stCondLst>
+                                  <p:childTnLst>
+                                    <p:set>
+                                      <p:cBhvr>
+                                        <p:cTn id="124" dur="1" fill="hold">
+                                          <p:stCondLst>
+                                            <p:cond delay="0"/>
+                                          </p:stCondLst>
+                                        </p:cTn>
+                                        <p:tgtEl>
+                                          <p:spTgt spid="73"/>
+                                        </p:tgtEl>
+                                        <p:attrNameLst>
+                                          <p:attrName>style.visibility</p:attrName>
+                                        </p:attrNameLst>
+                                      </p:cBhvr>
+                                      <p:to>
+                                        <p:strVal val="visible"/>
+                                      </p:to>
+                                    </p:set>
+                                    <p:animEffect transition="in" filter="blinds(horizontal)">
+                                      <p:cBhvr>
+                                        <p:cTn id="125" dur="500"/>
+                                        <p:tgtEl>
+                                          <p:spTgt spid="73"/>
+                                        </p:tgtEl>
+                                      </p:cBhvr>
+                                    </p:animEffect>
+                                  </p:childTnLst>
+                                </p:cTn>
+                              </p:par>
+                              <p:par>
+                                <p:cTn id="126" presetID="3" presetClass="entr" presetSubtype="10" fill="hold" nodeType="withEffect">
+                                  <p:stCondLst>
+                                    <p:cond delay="0"/>
+                                  </p:stCondLst>
+                                  <p:childTnLst>
+                                    <p:set>
+                                      <p:cBhvr>
+                                        <p:cTn id="127" dur="1" fill="hold">
+                                          <p:stCondLst>
+                                            <p:cond delay="0"/>
+                                          </p:stCondLst>
+                                        </p:cTn>
+                                        <p:tgtEl>
+                                          <p:spTgt spid="69"/>
+                                        </p:tgtEl>
+                                        <p:attrNameLst>
+                                          <p:attrName>style.visibility</p:attrName>
+                                        </p:attrNameLst>
+                                      </p:cBhvr>
+                                      <p:to>
+                                        <p:strVal val="visible"/>
+                                      </p:to>
+                                    </p:set>
+                                    <p:animEffect transition="in" filter="blinds(horizontal)">
+                                      <p:cBhvr>
+                                        <p:cTn id="128" dur="500"/>
+                                        <p:tgtEl>
+                                          <p:spTgt spid="69"/>
+                                        </p:tgtEl>
+                                      </p:cBhvr>
+                                    </p:animEffect>
+                                  </p:childTnLst>
+                                </p:cTn>
+                              </p:par>
+                              <p:par>
+                                <p:cTn id="129" presetID="3" presetClass="entr" presetSubtype="10" fill="hold" nodeType="withEffect">
+                                  <p:stCondLst>
+                                    <p:cond delay="0"/>
+                                  </p:stCondLst>
+                                  <p:childTnLst>
+                                    <p:set>
+                                      <p:cBhvr>
+                                        <p:cTn id="130" dur="1" fill="hold">
+                                          <p:stCondLst>
+                                            <p:cond delay="0"/>
+                                          </p:stCondLst>
+                                        </p:cTn>
+                                        <p:tgtEl>
+                                          <p:spTgt spid="68"/>
+                                        </p:tgtEl>
+                                        <p:attrNameLst>
+                                          <p:attrName>style.visibility</p:attrName>
+                                        </p:attrNameLst>
+                                      </p:cBhvr>
+                                      <p:to>
+                                        <p:strVal val="visible"/>
+                                      </p:to>
+                                    </p:set>
+                                    <p:animEffect transition="in" filter="blinds(horizontal)">
+                                      <p:cBhvr>
+                                        <p:cTn id="131" dur="500"/>
+                                        <p:tgtEl>
+                                          <p:spTgt spid="68"/>
+                                        </p:tgtEl>
+                                      </p:cBhvr>
+                                    </p:animEffect>
+                                  </p:childTnLst>
+                                </p:cTn>
+                              </p:par>
+                              <p:par>
+                                <p:cTn id="132" presetID="3" presetClass="entr" presetSubtype="10" fill="hold" nodeType="withEffect">
+                                  <p:stCondLst>
+                                    <p:cond delay="0"/>
+                                  </p:stCondLst>
+                                  <p:childTnLst>
+                                    <p:set>
+                                      <p:cBhvr>
+                                        <p:cTn id="133" dur="1" fill="hold">
+                                          <p:stCondLst>
+                                            <p:cond delay="0"/>
+                                          </p:stCondLst>
+                                        </p:cTn>
+                                        <p:tgtEl>
+                                          <p:spTgt spid="67"/>
+                                        </p:tgtEl>
+                                        <p:attrNameLst>
+                                          <p:attrName>style.visibility</p:attrName>
+                                        </p:attrNameLst>
+                                      </p:cBhvr>
+                                      <p:to>
+                                        <p:strVal val="visible"/>
+                                      </p:to>
+                                    </p:set>
+                                    <p:animEffect transition="in" filter="blinds(horizontal)">
+                                      <p:cBhvr>
+                                        <p:cTn id="134" dur="500"/>
+                                        <p:tgtEl>
+                                          <p:spTgt spid="67"/>
+                                        </p:tgtEl>
+                                      </p:cBhvr>
+                                    </p:animEffect>
+                                  </p:childTnLst>
+                                </p:cTn>
+                              </p:par>
+                              <p:par>
+                                <p:cTn id="135" presetID="3" presetClass="entr" presetSubtype="10" fill="hold" nodeType="withEffect">
+                                  <p:stCondLst>
+                                    <p:cond delay="0"/>
+                                  </p:stCondLst>
+                                  <p:childTnLst>
+                                    <p:set>
+                                      <p:cBhvr>
+                                        <p:cTn id="136" dur="1" fill="hold">
+                                          <p:stCondLst>
+                                            <p:cond delay="0"/>
+                                          </p:stCondLst>
+                                        </p:cTn>
+                                        <p:tgtEl>
+                                          <p:spTgt spid="66"/>
+                                        </p:tgtEl>
+                                        <p:attrNameLst>
+                                          <p:attrName>style.visibility</p:attrName>
+                                        </p:attrNameLst>
+                                      </p:cBhvr>
+                                      <p:to>
+                                        <p:strVal val="visible"/>
+                                      </p:to>
+                                    </p:set>
+                                    <p:animEffect transition="in" filter="blinds(horizontal)">
+                                      <p:cBhvr>
+                                        <p:cTn id="137" dur="500"/>
+                                        <p:tgtEl>
+                                          <p:spTgt spid="66"/>
                                         </p:tgtEl>
                                       </p:cBhvr>
                                     </p:animEffect>
@@ -8038,32 +8770,32 @@
                     </p:cTn>
                   </p:par>
                   <p:par>
-                    <p:cTn id="114" fill="hold">
+                    <p:cTn id="138" fill="hold">
                       <p:stCondLst>
                         <p:cond delay="indefinite"/>
                       </p:stCondLst>
                       <p:childTnLst>
                         <p:par>
-                          <p:cTn id="115" fill="hold">
+                          <p:cTn id="139" fill="hold">
                             <p:stCondLst>
                               <p:cond delay="0"/>
                             </p:stCondLst>
                             <p:childTnLst>
                               <p:par>
-                                <p:cTn id="116" presetID="3" presetClass="entr" presetSubtype="10" fill="hold" grpId="0" nodeType="clickEffect">
+                                <p:cTn id="140" presetID="3" presetClass="entr" presetSubtype="10" fill="hold" nodeType="clickEffect">
                                   <p:stCondLst>
                                     <p:cond delay="0"/>
                                   </p:stCondLst>
                                   <p:childTnLst>
                                     <p:set>
                                       <p:cBhvr>
-                                        <p:cTn id="117" dur="1" fill="hold">
+                                        <p:cTn id="141" dur="1" fill="hold">
                                           <p:stCondLst>
                                             <p:cond delay="0"/>
                                           </p:stCondLst>
                                         </p:cTn>
                                         <p:tgtEl>
-                                          <p:spTgt spid="62"/>
+                                          <p:spTgt spid="76"/>
                                         </p:tgtEl>
                                         <p:attrNameLst>
                                           <p:attrName>style.visibility</p:attrName>
@@ -8075,9 +8807,9 @@
                                     </p:set>
                                     <p:animEffect transition="in" filter="blinds(horizontal)">
                                       <p:cBhvr>
-                                        <p:cTn id="118" dur="500"/>
-                                        <p:tgtEl>
-                                          <p:spTgt spid="62"/>
+                                        <p:cTn id="142" dur="500"/>
+                                        <p:tgtEl>
+                                          <p:spTgt spid="76"/>
                                         </p:tgtEl>
                                       </p:cBhvr>
                                     </p:animEffect>
@@ -8085,20 +8817,20 @@
                                 </p:cTn>
                               </p:par>
                               <p:par>
-                                <p:cTn id="119" presetID="3" presetClass="entr" presetSubtype="10" fill="hold" grpId="0" nodeType="withEffect">
+                                <p:cTn id="143" presetID="3" presetClass="entr" presetSubtype="10" fill="hold" grpId="0" nodeType="withEffect">
                                   <p:stCondLst>
                                     <p:cond delay="0"/>
                                   </p:stCondLst>
                                   <p:childTnLst>
                                     <p:set>
                                       <p:cBhvr>
-                                        <p:cTn id="120" dur="1" fill="hold">
+                                        <p:cTn id="144" dur="1" fill="hold">
                                           <p:stCondLst>
                                             <p:cond delay="0"/>
                                           </p:stCondLst>
                                         </p:cTn>
                                         <p:tgtEl>
-                                          <p:spTgt spid="63"/>
+                                          <p:spTgt spid="78"/>
                                         </p:tgtEl>
                                         <p:attrNameLst>
                                           <p:attrName>style.visibility</p:attrName>
@@ -8110,359 +8842,9 @@
                                     </p:set>
                                     <p:animEffect transition="in" filter="blinds(horizontal)">
                                       <p:cBhvr>
-                                        <p:cTn id="121" dur="500"/>
-                                        <p:tgtEl>
-                                          <p:spTgt spid="63"/>
-                                        </p:tgtEl>
-                                      </p:cBhvr>
-                                    </p:animEffect>
-                                  </p:childTnLst>
-                                </p:cTn>
-                              </p:par>
-                              <p:par>
-                                <p:cTn id="122" presetID="3" presetClass="entr" presetSubtype="10" fill="hold" grpId="0" nodeType="withEffect">
-                                  <p:stCondLst>
-                                    <p:cond delay="0"/>
-                                  </p:stCondLst>
-                                  <p:childTnLst>
-                                    <p:set>
-                                      <p:cBhvr>
-                                        <p:cTn id="123" dur="1" fill="hold">
-                                          <p:stCondLst>
-                                            <p:cond delay="0"/>
-                                          </p:stCondLst>
-                                        </p:cTn>
-                                        <p:tgtEl>
-                                          <p:spTgt spid="64"/>
-                                        </p:tgtEl>
-                                        <p:attrNameLst>
-                                          <p:attrName>style.visibility</p:attrName>
-                                        </p:attrNameLst>
-                                      </p:cBhvr>
-                                      <p:to>
-                                        <p:strVal val="visible"/>
-                                      </p:to>
-                                    </p:set>
-                                    <p:animEffect transition="in" filter="blinds(horizontal)">
-                                      <p:cBhvr>
-                                        <p:cTn id="124" dur="500"/>
-                                        <p:tgtEl>
-                                          <p:spTgt spid="64"/>
-                                        </p:tgtEl>
-                                      </p:cBhvr>
-                                    </p:animEffect>
-                                  </p:childTnLst>
-                                </p:cTn>
-                              </p:par>
-                              <p:par>
-                                <p:cTn id="125" presetID="3" presetClass="entr" presetSubtype="10" fill="hold" grpId="0" nodeType="withEffect">
-                                  <p:stCondLst>
-                                    <p:cond delay="0"/>
-                                  </p:stCondLst>
-                                  <p:childTnLst>
-                                    <p:set>
-                                      <p:cBhvr>
-                                        <p:cTn id="126" dur="1" fill="hold">
-                                          <p:stCondLst>
-                                            <p:cond delay="0"/>
-                                          </p:stCondLst>
-                                        </p:cTn>
-                                        <p:tgtEl>
-                                          <p:spTgt spid="65"/>
-                                        </p:tgtEl>
-                                        <p:attrNameLst>
-                                          <p:attrName>style.visibility</p:attrName>
-                                        </p:attrNameLst>
-                                      </p:cBhvr>
-                                      <p:to>
-                                        <p:strVal val="visible"/>
-                                      </p:to>
-                                    </p:set>
-                                    <p:animEffect transition="in" filter="blinds(horizontal)">
-                                      <p:cBhvr>
-                                        <p:cTn id="127" dur="500"/>
-                                        <p:tgtEl>
-                                          <p:spTgt spid="65"/>
-                                        </p:tgtEl>
-                                      </p:cBhvr>
-                                    </p:animEffect>
-                                  </p:childTnLst>
-                                </p:cTn>
-                              </p:par>
-                              <p:par>
-                                <p:cTn id="128" presetID="3" presetClass="entr" presetSubtype="10" fill="hold" grpId="0" nodeType="withEffect">
-                                  <p:stCondLst>
-                                    <p:cond delay="0"/>
-                                  </p:stCondLst>
-                                  <p:childTnLst>
-                                    <p:set>
-                                      <p:cBhvr>
-                                        <p:cTn id="129" dur="1" fill="hold">
-                                          <p:stCondLst>
-                                            <p:cond delay="0"/>
-                                          </p:stCondLst>
-                                        </p:cTn>
-                                        <p:tgtEl>
-                                          <p:spTgt spid="70"/>
-                                        </p:tgtEl>
-                                        <p:attrNameLst>
-                                          <p:attrName>style.visibility</p:attrName>
-                                        </p:attrNameLst>
-                                      </p:cBhvr>
-                                      <p:to>
-                                        <p:strVal val="visible"/>
-                                      </p:to>
-                                    </p:set>
-                                    <p:animEffect transition="in" filter="blinds(horizontal)">
-                                      <p:cBhvr>
-                                        <p:cTn id="130" dur="500"/>
-                                        <p:tgtEl>
-                                          <p:spTgt spid="70"/>
-                                        </p:tgtEl>
-                                      </p:cBhvr>
-                                    </p:animEffect>
-                                  </p:childTnLst>
-                                </p:cTn>
-                              </p:par>
-                              <p:par>
-                                <p:cTn id="131" presetID="3" presetClass="entr" presetSubtype="10" fill="hold" grpId="0" nodeType="withEffect">
-                                  <p:stCondLst>
-                                    <p:cond delay="0"/>
-                                  </p:stCondLst>
-                                  <p:childTnLst>
-                                    <p:set>
-                                      <p:cBhvr>
-                                        <p:cTn id="132" dur="1" fill="hold">
-                                          <p:stCondLst>
-                                            <p:cond delay="0"/>
-                                          </p:stCondLst>
-                                        </p:cTn>
-                                        <p:tgtEl>
-                                          <p:spTgt spid="71"/>
-                                        </p:tgtEl>
-                                        <p:attrNameLst>
-                                          <p:attrName>style.visibility</p:attrName>
-                                        </p:attrNameLst>
-                                      </p:cBhvr>
-                                      <p:to>
-                                        <p:strVal val="visible"/>
-                                      </p:to>
-                                    </p:set>
-                                    <p:animEffect transition="in" filter="blinds(horizontal)">
-                                      <p:cBhvr>
-                                        <p:cTn id="133" dur="500"/>
-                                        <p:tgtEl>
-                                          <p:spTgt spid="71"/>
-                                        </p:tgtEl>
-                                      </p:cBhvr>
-                                    </p:animEffect>
-                                  </p:childTnLst>
-                                </p:cTn>
-                              </p:par>
-                              <p:par>
-                                <p:cTn id="134" presetID="3" presetClass="entr" presetSubtype="10" fill="hold" grpId="0" nodeType="withEffect">
-                                  <p:stCondLst>
-                                    <p:cond delay="0"/>
-                                  </p:stCondLst>
-                                  <p:childTnLst>
-                                    <p:set>
-                                      <p:cBhvr>
-                                        <p:cTn id="135" dur="1" fill="hold">
-                                          <p:stCondLst>
-                                            <p:cond delay="0"/>
-                                          </p:stCondLst>
-                                        </p:cTn>
-                                        <p:tgtEl>
-                                          <p:spTgt spid="72"/>
-                                        </p:tgtEl>
-                                        <p:attrNameLst>
-                                          <p:attrName>style.visibility</p:attrName>
-                                        </p:attrNameLst>
-                                      </p:cBhvr>
-                                      <p:to>
-                                        <p:strVal val="visible"/>
-                                      </p:to>
-                                    </p:set>
-                                    <p:animEffect transition="in" filter="blinds(horizontal)">
-                                      <p:cBhvr>
-                                        <p:cTn id="136" dur="500"/>
-                                        <p:tgtEl>
-                                          <p:spTgt spid="72"/>
-                                        </p:tgtEl>
-                                      </p:cBhvr>
-                                    </p:animEffect>
-                                  </p:childTnLst>
-                                </p:cTn>
-                              </p:par>
-                              <p:par>
-                                <p:cTn id="137" presetID="3" presetClass="entr" presetSubtype="10" fill="hold" grpId="0" nodeType="withEffect">
-                                  <p:stCondLst>
-                                    <p:cond delay="0"/>
-                                  </p:stCondLst>
-                                  <p:childTnLst>
-                                    <p:set>
-                                      <p:cBhvr>
-                                        <p:cTn id="138" dur="1" fill="hold">
-                                          <p:stCondLst>
-                                            <p:cond delay="0"/>
-                                          </p:stCondLst>
-                                        </p:cTn>
-                                        <p:tgtEl>
-                                          <p:spTgt spid="73"/>
-                                        </p:tgtEl>
-                                        <p:attrNameLst>
-                                          <p:attrName>style.visibility</p:attrName>
-                                        </p:attrNameLst>
-                                      </p:cBhvr>
-                                      <p:to>
-                                        <p:strVal val="visible"/>
-                                      </p:to>
-                                    </p:set>
-                                    <p:animEffect transition="in" filter="blinds(horizontal)">
-                                      <p:cBhvr>
-                                        <p:cTn id="139" dur="500"/>
-                                        <p:tgtEl>
-                                          <p:spTgt spid="73"/>
-                                        </p:tgtEl>
-                                      </p:cBhvr>
-                                    </p:animEffect>
-                                  </p:childTnLst>
-                                </p:cTn>
-                              </p:par>
-                              <p:par>
-                                <p:cTn id="140" presetID="3" presetClass="entr" presetSubtype="10" fill="hold" nodeType="withEffect">
-                                  <p:stCondLst>
-                                    <p:cond delay="0"/>
-                                  </p:stCondLst>
-                                  <p:childTnLst>
-                                    <p:set>
-                                      <p:cBhvr>
-                                        <p:cTn id="141" dur="1" fill="hold">
-                                          <p:stCondLst>
-                                            <p:cond delay="0"/>
-                                          </p:stCondLst>
-                                        </p:cTn>
-                                        <p:tgtEl>
-                                          <p:spTgt spid="69"/>
-                                        </p:tgtEl>
-                                        <p:attrNameLst>
-                                          <p:attrName>style.visibility</p:attrName>
-                                        </p:attrNameLst>
-                                      </p:cBhvr>
-                                      <p:to>
-                                        <p:strVal val="visible"/>
-                                      </p:to>
-                                    </p:set>
-                                    <p:animEffect transition="in" filter="blinds(horizontal)">
-                                      <p:cBhvr>
-                                        <p:cTn id="142" dur="500"/>
-                                        <p:tgtEl>
-                                          <p:spTgt spid="69"/>
-                                        </p:tgtEl>
-                                      </p:cBhvr>
-                                    </p:animEffect>
-                                  </p:childTnLst>
-                                </p:cTn>
-                              </p:par>
-                              <p:par>
-                                <p:cTn id="143" presetID="3" presetClass="entr" presetSubtype="10" fill="hold" nodeType="withEffect">
-                                  <p:stCondLst>
-                                    <p:cond delay="0"/>
-                                  </p:stCondLst>
-                                  <p:childTnLst>
-                                    <p:set>
-                                      <p:cBhvr>
-                                        <p:cTn id="144" dur="1" fill="hold">
-                                          <p:stCondLst>
-                                            <p:cond delay="0"/>
-                                          </p:stCondLst>
-                                        </p:cTn>
-                                        <p:tgtEl>
-                                          <p:spTgt spid="68"/>
-                                        </p:tgtEl>
-                                        <p:attrNameLst>
-                                          <p:attrName>style.visibility</p:attrName>
-                                        </p:attrNameLst>
-                                      </p:cBhvr>
-                                      <p:to>
-                                        <p:strVal val="visible"/>
-                                      </p:to>
-                                    </p:set>
-                                    <p:animEffect transition="in" filter="blinds(horizontal)">
-                                      <p:cBhvr>
                                         <p:cTn id="145" dur="500"/>
                                         <p:tgtEl>
-                                          <p:spTgt spid="68"/>
-                                        </p:tgtEl>
-                                      </p:cBhvr>
-                                    </p:animEffect>
-                                  </p:childTnLst>
-                                </p:cTn>
-                              </p:par>
-                              <p:par>
-                                <p:cTn id="146" presetID="3" presetClass="entr" presetSubtype="10" fill="hold" nodeType="withEffect">
-                                  <p:stCondLst>
-                                    <p:cond delay="0"/>
-                                  </p:stCondLst>
-                                  <p:childTnLst>
-                                    <p:set>
-                                      <p:cBhvr>
-                                        <p:cTn id="147" dur="1" fill="hold">
-                                          <p:stCondLst>
-                                            <p:cond delay="0"/>
-                                          </p:stCondLst>
-                                        </p:cTn>
-                                        <p:tgtEl>
-                                          <p:spTgt spid="67"/>
-                                        </p:tgtEl>
-                                        <p:attrNameLst>
-                                          <p:attrName>style.visibility</p:attrName>
-                                        </p:attrNameLst>
-                                      </p:cBhvr>
-                                      <p:to>
-                                        <p:strVal val="visible"/>
-                                      </p:to>
-                                    </p:set>
-                                    <p:animEffect transition="in" filter="blinds(horizontal)">
-                                      <p:cBhvr>
-                                        <p:cTn id="148" dur="500"/>
-                                        <p:tgtEl>
-                                          <p:spTgt spid="67"/>
-                                        </p:tgtEl>
-                                      </p:cBhvr>
-                                    </p:animEffect>
-                                  </p:childTnLst>
-                                </p:cTn>
-                              </p:par>
-                              <p:par>
-                                <p:cTn id="149" presetID="3" presetClass="entr" presetSubtype="10" fill="hold" nodeType="withEffect">
-                                  <p:stCondLst>
-                                    <p:cond delay="0"/>
-                                  </p:stCondLst>
-                                  <p:childTnLst>
-                                    <p:set>
-                                      <p:cBhvr>
-                                        <p:cTn id="150" dur="1" fill="hold">
-                                          <p:stCondLst>
-                                            <p:cond delay="0"/>
-                                          </p:stCondLst>
-                                        </p:cTn>
-                                        <p:tgtEl>
-                                          <p:spTgt spid="66"/>
-                                        </p:tgtEl>
-                                        <p:attrNameLst>
-                                          <p:attrName>style.visibility</p:attrName>
-                                        </p:attrNameLst>
-                                      </p:cBhvr>
-                                      <p:to>
-                                        <p:strVal val="visible"/>
-                                      </p:to>
-                                    </p:set>
-                                    <p:animEffect transition="in" filter="blinds(horizontal)">
-                                      <p:cBhvr>
-                                        <p:cTn id="151" dur="500"/>
-                                        <p:tgtEl>
-                                          <p:spTgt spid="66"/>
+                                          <p:spTgt spid="78"/>
                                         </p:tgtEl>
                                       </p:cBhvr>
                                     </p:animEffect>
@@ -8476,32 +8858,122 @@
                     </p:cTn>
                   </p:par>
                   <p:par>
-                    <p:cTn id="152" fill="hold">
+                    <p:cTn id="146" fill="hold">
                       <p:stCondLst>
                         <p:cond delay="indefinite"/>
                       </p:stCondLst>
                       <p:childTnLst>
                         <p:par>
-                          <p:cTn id="153" fill="hold">
+                          <p:cTn id="147" fill="hold">
                             <p:stCondLst>
                               <p:cond delay="0"/>
                             </p:stCondLst>
                             <p:childTnLst>
                               <p:par>
-                                <p:cTn id="154" presetID="3" presetClass="entr" presetSubtype="10" fill="hold" nodeType="clickEffect">
+                                <p:cTn id="148" presetID="3" presetClass="entr" presetSubtype="10" fill="hold" grpId="0" nodeType="clickEffect">
                                   <p:stCondLst>
                                     <p:cond delay="0"/>
                                   </p:stCondLst>
                                   <p:childTnLst>
                                     <p:set>
                                       <p:cBhvr>
+                                        <p:cTn id="149" dur="1" fill="hold">
+                                          <p:stCondLst>
+                                            <p:cond delay="0"/>
+                                          </p:stCondLst>
+                                        </p:cTn>
+                                        <p:tgtEl>
+                                          <p:spTgt spid="2">
+                                            <p:txEl>
+                                              <p:pRg st="6" end="6"/>
+                                            </p:txEl>
+                                          </p:spTgt>
+                                        </p:tgtEl>
+                                        <p:attrNameLst>
+                                          <p:attrName>style.visibility</p:attrName>
+                                        </p:attrNameLst>
+                                      </p:cBhvr>
+                                      <p:to>
+                                        <p:strVal val="visible"/>
+                                      </p:to>
+                                    </p:set>
+                                    <p:animEffect transition="in" filter="blinds(horizontal)">
+                                      <p:cBhvr>
+                                        <p:cTn id="150" dur="500"/>
+                                        <p:tgtEl>
+                                          <p:spTgt spid="2">
+                                            <p:txEl>
+                                              <p:pRg st="6" end="6"/>
+                                            </p:txEl>
+                                          </p:spTgt>
+                                        </p:tgtEl>
+                                      </p:cBhvr>
+                                    </p:animEffect>
+                                  </p:childTnLst>
+                                </p:cTn>
+                              </p:par>
+                              <p:par>
+                                <p:cTn id="151" presetID="3" presetClass="entr" presetSubtype="10" fill="hold" grpId="0" nodeType="withEffect">
+                                  <p:stCondLst>
+                                    <p:cond delay="0"/>
+                                  </p:stCondLst>
+                                  <p:childTnLst>
+                                    <p:set>
+                                      <p:cBhvr>
+                                        <p:cTn id="152" dur="1" fill="hold">
+                                          <p:stCondLst>
+                                            <p:cond delay="0"/>
+                                          </p:stCondLst>
+                                        </p:cTn>
+                                        <p:tgtEl>
+                                          <p:spTgt spid="2">
+                                            <p:txEl>
+                                              <p:pRg st="7" end="7"/>
+                                            </p:txEl>
+                                          </p:spTgt>
+                                        </p:tgtEl>
+                                        <p:attrNameLst>
+                                          <p:attrName>style.visibility</p:attrName>
+                                        </p:attrNameLst>
+                                      </p:cBhvr>
+                                      <p:to>
+                                        <p:strVal val="visible"/>
+                                      </p:to>
+                                    </p:set>
+                                    <p:animEffect transition="in" filter="blinds(horizontal)">
+                                      <p:cBhvr>
+                                        <p:cTn id="153" dur="500"/>
+                                        <p:tgtEl>
+                                          <p:spTgt spid="2">
+                                            <p:txEl>
+                                              <p:pRg st="7" end="7"/>
+                                            </p:txEl>
+                                          </p:spTgt>
+                                        </p:tgtEl>
+                                      </p:cBhvr>
+                                    </p:animEffect>
+                                  </p:childTnLst>
+                                </p:cTn>
+                              </p:par>
+                              <p:par>
+                                <p:cTn id="154" presetID="3" presetClass="entr" presetSubtype="10" fill="hold" grpId="0" nodeType="withEffect">
+                                  <p:stCondLst>
+                                    <p:cond delay="0"/>
+                                  </p:stCondLst>
+                                  <p:childTnLst>
+                                    <p:set>
+                                      <p:cBhvr>
                                         <p:cTn id="155" dur="1" fill="hold">
                                           <p:stCondLst>
                                             <p:cond delay="0"/>
                                           </p:stCondLst>
                                         </p:cTn>
                                         <p:tgtEl>
-                                          <p:spTgt spid="76"/>
+                                          <p:spTgt spid="2">
+                                            <p:txEl>
+                                              <p:pRg st="8" end="8"/>
+                                            </p:txEl>
+                                          </p:spTgt>
                                         </p:tgtEl>
                                         <p:attrNameLst>
                                           <p:attrName>style.visibility</p:attrName>
@@ -8515,7 +8987,11 @@
                                       <p:cBhvr>
                                         <p:cTn id="156" dur="500"/>
                                         <p:tgtEl>
-                                          <p:spTgt spid="76"/>
+                                          <p:spTgt spid="2">
+                                            <p:txEl>
+                                              <p:pRg st="8" end="8"/>
+                                            </p:txEl>
+                                          </p:spTgt>
                                         </p:tgtEl>
                                       </p:cBhvr>
                                     </p:animEffect>
@@ -8536,7 +9012,11 @@
                                           </p:stCondLst>
                                         </p:cTn>
                                         <p:tgtEl>
-                                          <p:spTgt spid="78"/>
+                                          <p:spTgt spid="2">
+                                            <p:txEl>
+                                              <p:pRg st="9" end="9"/>
+                                            </p:txEl>
+                                          </p:spTgt>
                                         </p:tgtEl>
                                         <p:attrNameLst>
                                           <p:attrName>style.visibility</p:attrName>
@@ -8550,7 +9030,11 @@
                                       <p:cBhvr>
                                         <p:cTn id="159" dur="500"/>
                                         <p:tgtEl>
-                                          <p:spTgt spid="78"/>
+                                          <p:spTgt spid="2">
+                                            <p:txEl>
+                                              <p:pRg st="9" end="9"/>
+                                            </p:txEl>
+                                          </p:spTgt>
                                         </p:tgtEl>
                                       </p:cBhvr>
                                     </p:animEffect>

</xml_diff>